<commit_message>
some updates from oral exam preparation
</commit_message>
<xml_diff>
--- a/heroin_model_formulation/heroin_schematic.pptx
+++ b/heroin_model_formulation/heroin_schematic.pptx
@@ -301,7 +301,7 @@
           <a:lstStyle/>
           <a:p>
             <a:fld id="{5A3E0873-EA00-D142-ACA6-784333225662}" type="datetimeFigureOut">
-              <a:t>4/1/18</a:t>
+              <a:t>5/23/18</a:t>
             </a:fld>
             <a:endParaRPr lang="en-US"/>
           </a:p>
@@ -467,7 +467,7 @@
           <a:lstStyle/>
           <a:p>
             <a:fld id="{5A3E0873-EA00-D142-ACA6-784333225662}" type="datetimeFigureOut">
-              <a:t>4/1/18</a:t>
+              <a:t>5/23/18</a:t>
             </a:fld>
             <a:endParaRPr lang="en-US"/>
           </a:p>
@@ -643,7 +643,7 @@
           <a:lstStyle/>
           <a:p>
             <a:fld id="{5A3E0873-EA00-D142-ACA6-784333225662}" type="datetimeFigureOut">
-              <a:t>4/1/18</a:t>
+              <a:t>5/23/18</a:t>
             </a:fld>
             <a:endParaRPr lang="en-US"/>
           </a:p>
@@ -809,7 +809,7 @@
           <a:lstStyle/>
           <a:p>
             <a:fld id="{5A3E0873-EA00-D142-ACA6-784333225662}" type="datetimeFigureOut">
-              <a:t>4/1/18</a:t>
+              <a:t>5/23/18</a:t>
             </a:fld>
             <a:endParaRPr lang="en-US"/>
           </a:p>
@@ -1052,7 +1052,7 @@
           <a:lstStyle/>
           <a:p>
             <a:fld id="{5A3E0873-EA00-D142-ACA6-784333225662}" type="datetimeFigureOut">
-              <a:t>4/1/18</a:t>
+              <a:t>5/23/18</a:t>
             </a:fld>
             <a:endParaRPr lang="en-US"/>
           </a:p>
@@ -1335,7 +1335,7 @@
           <a:lstStyle/>
           <a:p>
             <a:fld id="{5A3E0873-EA00-D142-ACA6-784333225662}" type="datetimeFigureOut">
-              <a:t>4/1/18</a:t>
+              <a:t>5/23/18</a:t>
             </a:fld>
             <a:endParaRPr lang="en-US"/>
           </a:p>
@@ -1752,7 +1752,7 @@
           <a:lstStyle/>
           <a:p>
             <a:fld id="{5A3E0873-EA00-D142-ACA6-784333225662}" type="datetimeFigureOut">
-              <a:t>4/1/18</a:t>
+              <a:t>5/23/18</a:t>
             </a:fld>
             <a:endParaRPr lang="en-US"/>
           </a:p>
@@ -1867,7 +1867,7 @@
           <a:lstStyle/>
           <a:p>
             <a:fld id="{5A3E0873-EA00-D142-ACA6-784333225662}" type="datetimeFigureOut">
-              <a:t>4/1/18</a:t>
+              <a:t>5/23/18</a:t>
             </a:fld>
             <a:endParaRPr lang="en-US"/>
           </a:p>
@@ -1960,7 +1960,7 @@
           <a:lstStyle/>
           <a:p>
             <a:fld id="{5A3E0873-EA00-D142-ACA6-784333225662}" type="datetimeFigureOut">
-              <a:t>4/1/18</a:t>
+              <a:t>5/23/18</a:t>
             </a:fld>
             <a:endParaRPr lang="en-US"/>
           </a:p>
@@ -2233,7 +2233,7 @@
           <a:lstStyle/>
           <a:p>
             <a:fld id="{5A3E0873-EA00-D142-ACA6-784333225662}" type="datetimeFigureOut">
-              <a:t>4/1/18</a:t>
+              <a:t>5/23/18</a:t>
             </a:fld>
             <a:endParaRPr lang="en-US"/>
           </a:p>
@@ -2483,7 +2483,7 @@
           <a:lstStyle/>
           <a:p>
             <a:fld id="{5A3E0873-EA00-D142-ACA6-784333225662}" type="datetimeFigureOut">
-              <a:t>4/1/18</a:t>
+              <a:t>5/23/18</a:t>
             </a:fld>
             <a:endParaRPr lang="en-US"/>
           </a:p>
@@ -2692,7 +2692,7 @@
           </a:lstStyle>
           <a:p>
             <a:fld id="{5A3E0873-EA00-D142-ACA6-784333225662}" type="datetimeFigureOut">
-              <a:t>4/1/18</a:t>
+              <a:t>5/23/18</a:t>
             </a:fld>
             <a:endParaRPr lang="en-US"/>
           </a:p>
@@ -4588,16 +4588,305 @@
           </a:fontRef>
         </p:style>
       </p:cxnSp>
+      <p:sp>
+        <p:nvSpPr>
+          <p:cNvPr id="53" name="Arc 52"/>
+          <p:cNvSpPr/>
+          <p:nvPr/>
+        </p:nvSpPr>
+        <p:spPr>
+          <a:xfrm rot="19175766">
+            <a:off x="2635321" y="1299700"/>
+            <a:ext cx="6375996" cy="6645018"/>
+          </a:xfrm>
+          <a:prstGeom prst="arc">
+            <a:avLst>
+              <a:gd name="adj1" fmla="val 16051718"/>
+              <a:gd name="adj2" fmla="val 21038730"/>
+            </a:avLst>
+          </a:prstGeom>
+          <a:ln w="34925">
+            <a:headEnd type="oval"/>
+            <a:tailEnd type="triangle" w="lg" len="lg"/>
+          </a:ln>
+          <a:effectLst/>
+        </p:spPr>
+        <p:style>
+          <a:lnRef idx="2">
+            <a:schemeClr val="accent1"/>
+          </a:lnRef>
+          <a:fillRef idx="0">
+            <a:schemeClr val="accent1"/>
+          </a:fillRef>
+          <a:effectRef idx="1">
+            <a:schemeClr val="accent1"/>
+          </a:effectRef>
+          <a:fontRef idx="minor">
+            <a:schemeClr val="tx1"/>
+          </a:fontRef>
+        </p:style>
+        <p:txBody>
+          <a:bodyPr rtlCol="0" anchor="ctr"/>
+          <a:lstStyle/>
+          <a:p>
+            <a:pPr algn="ctr"/>
+            <a:endParaRPr lang="en-US"/>
+          </a:p>
+        </p:txBody>
+      </p:sp>
+      <p:sp>
+        <p:nvSpPr>
+          <p:cNvPr id="70" name="TextBox 69"/>
+          <p:cNvSpPr txBox="1"/>
+          <p:nvPr/>
+        </p:nvSpPr>
+        <p:spPr>
+          <a:xfrm>
+            <a:off x="8244149" y="2722525"/>
+            <a:ext cx="879373" cy="307777"/>
+          </a:xfrm>
+          <a:prstGeom prst="rect">
+            <a:avLst/>
+          </a:prstGeom>
+          <a:noFill/>
+        </p:spPr>
+        <p:txBody>
+          <a:bodyPr wrap="square" rtlCol="0">
+            <a:spAutoFit/>
+          </a:bodyPr>
+          <a:lstStyle/>
+          <a:p>
+            <a:pPr algn="ctr"/>
+            <a:r>
+              <a:rPr lang="en-US" sz="1400" dirty="0">
+                <a:latin typeface="Times New Roman" charset="0"/>
+                <a:ea typeface="Times New Roman" charset="0"/>
+                <a:cs typeface="Times New Roman" charset="0"/>
+              </a:rPr>
+              <a:t>(𝜇 +𝜇</a:t>
+            </a:r>
+            <a:r>
+              <a:rPr lang="en-US" sz="1400" baseline="-25000" dirty="0">
+                <a:latin typeface="Times New Roman" charset="0"/>
+                <a:ea typeface="Times New Roman" charset="0"/>
+                <a:cs typeface="Times New Roman" charset="0"/>
+              </a:rPr>
+              <a:t>H</a:t>
+            </a:r>
+            <a:r>
+              <a:rPr lang="en-US" sz="1400" dirty="0">
+                <a:latin typeface="Times New Roman" charset="0"/>
+                <a:ea typeface="Times New Roman" charset="0"/>
+                <a:cs typeface="Times New Roman" charset="0"/>
+              </a:rPr>
+              <a:t>)H</a:t>
+            </a:r>
+          </a:p>
+        </p:txBody>
+      </p:sp>
+      <p:sp>
+        <p:nvSpPr>
+          <p:cNvPr id="72" name="Arc 71"/>
+          <p:cNvSpPr/>
+          <p:nvPr/>
+        </p:nvSpPr>
+        <p:spPr>
+          <a:xfrm rot="19175766">
+            <a:off x="627268" y="305942"/>
+            <a:ext cx="8221918" cy="8487514"/>
+          </a:xfrm>
+          <a:prstGeom prst="arc">
+            <a:avLst>
+              <a:gd name="adj1" fmla="val 15338255"/>
+              <a:gd name="adj2" fmla="val 294909"/>
+            </a:avLst>
+          </a:prstGeom>
+          <a:ln w="34925">
+            <a:headEnd type="oval"/>
+            <a:tailEnd type="triangle" w="lg" len="lg"/>
+          </a:ln>
+          <a:effectLst/>
+        </p:spPr>
+        <p:style>
+          <a:lnRef idx="2">
+            <a:schemeClr val="accent1"/>
+          </a:lnRef>
+          <a:fillRef idx="0">
+            <a:schemeClr val="accent1"/>
+          </a:fillRef>
+          <a:effectRef idx="1">
+            <a:schemeClr val="accent1"/>
+          </a:effectRef>
+          <a:fontRef idx="minor">
+            <a:schemeClr val="tx1"/>
+          </a:fontRef>
+        </p:style>
+        <p:txBody>
+          <a:bodyPr rtlCol="0" anchor="ctr"/>
+          <a:lstStyle/>
+          <a:p>
+            <a:pPr algn="ctr"/>
+            <a:endParaRPr lang="en-US"/>
+          </a:p>
+        </p:txBody>
+      </p:sp>
+      <p:sp>
+        <p:nvSpPr>
+          <p:cNvPr id="24" name="Rectangle 23"/>
+          <p:cNvSpPr/>
+          <p:nvPr/>
+        </p:nvSpPr>
+        <p:spPr>
+          <a:xfrm>
+            <a:off x="4232644" y="72543"/>
+            <a:ext cx="753732" cy="307777"/>
+          </a:xfrm>
+          <a:prstGeom prst="rect">
+            <a:avLst/>
+          </a:prstGeom>
+        </p:spPr>
+        <p:txBody>
+          <a:bodyPr wrap="none">
+            <a:spAutoFit/>
+          </a:bodyPr>
+          <a:lstStyle/>
+          <a:p>
+            <a:pPr algn="ctr"/>
+            <a:r>
+              <a:rPr lang="en-US" sz="1400" dirty="0">
+                <a:latin typeface="Times New Roman" charset="0"/>
+                <a:ea typeface="Times New Roman" charset="0"/>
+                <a:cs typeface="Times New Roman" charset="0"/>
+              </a:rPr>
+              <a:t>    𝜃</a:t>
+            </a:r>
+            <a:r>
+              <a:rPr lang="en-US" sz="1400" baseline="-25000" dirty="0">
+                <a:latin typeface="Times New Roman" charset="0"/>
+                <a:ea typeface="Times New Roman" charset="0"/>
+                <a:cs typeface="Times New Roman" charset="0"/>
+              </a:rPr>
+              <a:t>1</a:t>
+            </a:r>
+            <a:r>
+              <a:rPr lang="en-US" sz="1400" dirty="0">
+                <a:latin typeface="Times New Roman" charset="0"/>
+                <a:ea typeface="Times New Roman" charset="0"/>
+                <a:cs typeface="Times New Roman" charset="0"/>
+              </a:rPr>
+              <a:t>SH</a:t>
+            </a:r>
+          </a:p>
+        </p:txBody>
+      </p:sp>
+      <p:sp>
+        <p:nvSpPr>
+          <p:cNvPr id="57" name="Rectangle 56"/>
+          <p:cNvSpPr/>
+          <p:nvPr/>
+        </p:nvSpPr>
+        <p:spPr>
+          <a:xfrm>
+            <a:off x="5471708" y="1054850"/>
+            <a:ext cx="753732" cy="307777"/>
+          </a:xfrm>
+          <a:prstGeom prst="rect">
+            <a:avLst/>
+          </a:prstGeom>
+        </p:spPr>
+        <p:txBody>
+          <a:bodyPr wrap="none">
+            <a:spAutoFit/>
+          </a:bodyPr>
+          <a:lstStyle/>
+          <a:p>
+            <a:pPr algn="ctr"/>
+            <a:r>
+              <a:rPr lang="en-US" sz="1400" dirty="0">
+                <a:latin typeface="Times New Roman" charset="0"/>
+                <a:ea typeface="Times New Roman" charset="0"/>
+                <a:cs typeface="Times New Roman" charset="0"/>
+              </a:rPr>
+              <a:t>    𝜃</a:t>
+            </a:r>
+            <a:r>
+              <a:rPr lang="en-US" sz="1400" baseline="-25000" dirty="0">
+                <a:latin typeface="Times New Roman" charset="0"/>
+                <a:ea typeface="Times New Roman" charset="0"/>
+                <a:cs typeface="Times New Roman" charset="0"/>
+              </a:rPr>
+              <a:t>2</a:t>
+            </a:r>
+            <a:r>
+              <a:rPr lang="en-US" sz="1400" dirty="0">
+                <a:latin typeface="Times New Roman" charset="0"/>
+                <a:ea typeface="Times New Roman" charset="0"/>
+                <a:cs typeface="Times New Roman" charset="0"/>
+              </a:rPr>
+              <a:t>PH</a:t>
+            </a:r>
+          </a:p>
+        </p:txBody>
+      </p:sp>
+      <p:sp>
+        <p:nvSpPr>
+          <p:cNvPr id="31" name="Rectangle 30"/>
+          <p:cNvSpPr/>
+          <p:nvPr/>
+        </p:nvSpPr>
+        <p:spPr>
+          <a:xfrm>
+            <a:off x="6394424" y="2354550"/>
+            <a:ext cx="604654" cy="307777"/>
+          </a:xfrm>
+          <a:prstGeom prst="rect">
+            <a:avLst/>
+          </a:prstGeom>
+        </p:spPr>
+        <p:txBody>
+          <a:bodyPr wrap="none">
+            <a:spAutoFit/>
+          </a:bodyPr>
+          <a:lstStyle/>
+          <a:p>
+            <a:pPr algn="ctr"/>
+            <a:r>
+              <a:rPr lang="en-US" sz="1400" dirty="0">
+                <a:latin typeface="Times New Roman" charset="0"/>
+                <a:ea typeface="Times New Roman" charset="0"/>
+                <a:cs typeface="Times New Roman" charset="0"/>
+              </a:rPr>
+              <a:t>𝜃</a:t>
+            </a:r>
+            <a:r>
+              <a:rPr lang="en-US" sz="1400" baseline="-25000" dirty="0">
+                <a:latin typeface="Times New Roman" charset="0"/>
+                <a:ea typeface="Times New Roman" charset="0"/>
+                <a:cs typeface="Times New Roman" charset="0"/>
+              </a:rPr>
+              <a:t>3</a:t>
+            </a:r>
+            <a:r>
+              <a:rPr lang="en-US" sz="1400" dirty="0">
+                <a:latin typeface="Times New Roman" charset="0"/>
+                <a:ea typeface="Times New Roman" charset="0"/>
+                <a:cs typeface="Times New Roman" charset="0"/>
+              </a:rPr>
+              <a:t>AH</a:t>
+            </a:r>
+          </a:p>
+        </p:txBody>
+      </p:sp>
       <p:cxnSp>
         <p:nvCxnSpPr>
-          <p:cNvPr id="52" name="Straight Arrow Connector 51"/>
+          <p:cNvPr id="71" name="Straight Arrow Connector 70"/>
           <p:cNvCxnSpPr/>
           <p:nvPr/>
         </p:nvCxnSpPr>
         <p:spPr>
           <a:xfrm flipV="1">
-            <a:off x="371372" y="2866726"/>
-            <a:ext cx="517758" cy="9688"/>
+            <a:off x="6018877" y="1866162"/>
+            <a:ext cx="0" cy="346908"/>
           </a:xfrm>
           <a:prstGeom prst="straightConnector1">
             <a:avLst/>
@@ -4628,25 +4917,22 @@
           </a:fontRef>
         </p:style>
       </p:cxnSp>
-      <p:sp>
-        <p:nvSpPr>
-          <p:cNvPr id="53" name="Arc 52"/>
-          <p:cNvSpPr/>
+      <p:cxnSp>
+        <p:nvCxnSpPr>
+          <p:cNvPr id="74" name="Straight Arrow Connector 73"/>
+          <p:cNvCxnSpPr/>
           <p:nvPr/>
-        </p:nvSpPr>
-        <p:spPr>
-          <a:xfrm rot="19175766">
-            <a:off x="2635321" y="1299700"/>
-            <a:ext cx="6375996" cy="6645018"/>
-          </a:xfrm>
-          <a:prstGeom prst="arc">
-            <a:avLst>
-              <a:gd name="adj1" fmla="val 16051718"/>
-              <a:gd name="adj2" fmla="val 21038730"/>
-            </a:avLst>
+        </p:nvCxnSpPr>
+        <p:spPr>
+          <a:xfrm flipV="1">
+            <a:off x="5466192" y="3187155"/>
+            <a:ext cx="2390564" cy="1397188"/>
+          </a:xfrm>
+          <a:prstGeom prst="straightConnector1">
+            <a:avLst/>
           </a:prstGeom>
           <a:ln w="34925">
-            <a:headEnd type="oval"/>
+            <a:headEnd type="oval" w="med" len="med"/>
             <a:tailEnd type="triangle" w="lg" len="lg"/>
           </a:ln>
           <a:effectLst/>
@@ -4665,33 +4951,24 @@
             <a:schemeClr val="tx1"/>
           </a:fontRef>
         </p:style>
-        <p:txBody>
-          <a:bodyPr rtlCol="0" anchor="ctr"/>
-          <a:lstStyle/>
-          <a:p>
-            <a:pPr algn="ctr"/>
-            <a:endParaRPr lang="en-US"/>
-          </a:p>
-        </p:txBody>
-      </p:sp>
-      <p:sp>
-        <p:nvSpPr>
-          <p:cNvPr id="70" name="TextBox 69"/>
-          <p:cNvSpPr txBox="1"/>
+      </p:cxnSp>
+      <p:sp>
+        <p:nvSpPr>
+          <p:cNvPr id="75" name="Rectangle 74"/>
+          <p:cNvSpPr/>
           <p:nvPr/>
         </p:nvSpPr>
         <p:spPr>
           <a:xfrm>
-            <a:off x="8244149" y="2722525"/>
-            <a:ext cx="879373" cy="307777"/>
+            <a:off x="6696751" y="3822359"/>
+            <a:ext cx="532518" cy="307777"/>
           </a:xfrm>
           <a:prstGeom prst="rect">
             <a:avLst/>
           </a:prstGeom>
-          <a:noFill/>
-        </p:spPr>
-        <p:txBody>
-          <a:bodyPr wrap="square" rtlCol="0">
+        </p:spPr>
+        <p:txBody>
+          <a:bodyPr wrap="none">
             <a:spAutoFit/>
           </a:bodyPr>
           <a:lstStyle/>
@@ -4703,10 +4980,18 @@
                 <a:ea typeface="Times New Roman" charset="0"/>
                 <a:cs typeface="Times New Roman" charset="0"/>
               </a:rPr>
-              <a:t>(𝜇 +𝜇</a:t>
-            </a:r>
-            <a:r>
-              <a:rPr lang="en-US" sz="1400" baseline="-25000" dirty="0">
+              <a:t> </a:t>
+            </a:r>
+            <a:r>
+              <a:rPr lang="en-US" sz="1400" dirty="0" err="1">
+                <a:latin typeface="Times New Roman" charset="0"/>
+                <a:ea typeface="Times New Roman" charset="0"/>
+                <a:cs typeface="Times New Roman" charset="0"/>
+              </a:rPr>
+              <a:t>σ</a:t>
+            </a:r>
+            <a:r>
+              <a:rPr lang="en-US" sz="1400" baseline="-25000" dirty="0" err="1">
                 <a:latin typeface="Times New Roman" charset="0"/>
                 <a:ea typeface="Times New Roman" charset="0"/>
                 <a:cs typeface="Times New Roman" charset="0"/>
@@ -4714,35 +4999,37 @@
               <a:t>H</a:t>
             </a:r>
             <a:r>
-              <a:rPr lang="en-US" sz="1400" dirty="0">
+              <a:rPr lang="en-US" sz="1400" dirty="0" err="1">
                 <a:latin typeface="Times New Roman" charset="0"/>
                 <a:ea typeface="Times New Roman" charset="0"/>
                 <a:cs typeface="Times New Roman" charset="0"/>
               </a:rPr>
-              <a:t>)H</a:t>
-            </a:r>
-          </a:p>
-        </p:txBody>
-      </p:sp>
-      <p:sp>
-        <p:nvSpPr>
-          <p:cNvPr id="72" name="Arc 71"/>
-          <p:cNvSpPr/>
+              <a:t>R</a:t>
+            </a:r>
+            <a:endParaRPr lang="en-US" sz="1400" dirty="0">
+              <a:latin typeface="Times New Roman" charset="0"/>
+              <a:ea typeface="Times New Roman" charset="0"/>
+              <a:cs typeface="Times New Roman" charset="0"/>
+            </a:endParaRPr>
+          </a:p>
+        </p:txBody>
+      </p:sp>
+      <p:cxnSp>
+        <p:nvCxnSpPr>
+          <p:cNvPr id="77" name="Straight Arrow Connector 76"/>
+          <p:cNvCxnSpPr/>
           <p:nvPr/>
-        </p:nvSpPr>
-        <p:spPr>
-          <a:xfrm rot="19175766">
-            <a:off x="627268" y="305942"/>
-            <a:ext cx="8221918" cy="8487514"/>
-          </a:xfrm>
-          <a:prstGeom prst="arc">
-            <a:avLst>
-              <a:gd name="adj1" fmla="val 15338255"/>
-              <a:gd name="adj2" fmla="val 294909"/>
-            </a:avLst>
+        </p:nvCxnSpPr>
+        <p:spPr>
+          <a:xfrm flipH="1">
+            <a:off x="5405069" y="3155792"/>
+            <a:ext cx="2023350" cy="1148356"/>
+          </a:xfrm>
+          <a:prstGeom prst="straightConnector1">
+            <a:avLst/>
           </a:prstGeom>
           <a:ln w="34925">
-            <a:headEnd type="oval"/>
+            <a:headEnd type="oval" w="med" len="med"/>
             <a:tailEnd type="triangle" w="lg" len="lg"/>
           </a:ln>
           <a:effectLst/>
@@ -4761,25 +5048,17 @@
             <a:schemeClr val="tx1"/>
           </a:fontRef>
         </p:style>
-        <p:txBody>
-          <a:bodyPr rtlCol="0" anchor="ctr"/>
-          <a:lstStyle/>
-          <a:p>
-            <a:pPr algn="ctr"/>
-            <a:endParaRPr lang="en-US"/>
-          </a:p>
-        </p:txBody>
-      </p:sp>
-      <p:sp>
-        <p:nvSpPr>
-          <p:cNvPr id="24" name="Rectangle 23"/>
+      </p:cxnSp>
+      <p:sp>
+        <p:nvSpPr>
+          <p:cNvPr id="82" name="Rectangle 81"/>
           <p:cNvSpPr/>
           <p:nvPr/>
         </p:nvSpPr>
         <p:spPr>
           <a:xfrm>
-            <a:off x="4232644" y="72543"/>
-            <a:ext cx="753732" cy="307777"/>
+            <a:off x="6291601" y="3373776"/>
+            <a:ext cx="405880" cy="307777"/>
           </a:xfrm>
           <a:prstGeom prst="rect">
             <a:avLst/>
@@ -4793,140 +5072,39 @@
           <a:p>
             <a:pPr algn="ctr"/>
             <a:r>
-              <a:rPr lang="en-US" sz="1400" dirty="0">
+              <a:rPr lang="en-US" sz="1400">
                 <a:latin typeface="Times New Roman" charset="0"/>
                 <a:ea typeface="Times New Roman" charset="0"/>
                 <a:cs typeface="Times New Roman" charset="0"/>
               </a:rPr>
-              <a:t>    𝜃</a:t>
-            </a:r>
-            <a:r>
-              <a:rPr lang="en-US" sz="1400" baseline="-25000" dirty="0">
-                <a:latin typeface="Times New Roman" charset="0"/>
-                <a:ea typeface="Times New Roman" charset="0"/>
-                <a:cs typeface="Times New Roman" charset="0"/>
-              </a:rPr>
-              <a:t>1</a:t>
-            </a:r>
-            <a:r>
-              <a:rPr lang="en-US" sz="1400" dirty="0">
-                <a:latin typeface="Times New Roman" charset="0"/>
-                <a:ea typeface="Times New Roman" charset="0"/>
-                <a:cs typeface="Times New Roman" charset="0"/>
-              </a:rPr>
-              <a:t>SH</a:t>
-            </a:r>
-          </a:p>
-        </p:txBody>
-      </p:sp>
-      <p:sp>
-        <p:nvSpPr>
-          <p:cNvPr id="57" name="Rectangle 56"/>
-          <p:cNvSpPr/>
-          <p:nvPr/>
-        </p:nvSpPr>
-        <p:spPr>
-          <a:xfrm>
-            <a:off x="5471708" y="1054850"/>
-            <a:ext cx="753732" cy="307777"/>
-          </a:xfrm>
-          <a:prstGeom prst="rect">
-            <a:avLst/>
-          </a:prstGeom>
-        </p:spPr>
-        <p:txBody>
-          <a:bodyPr wrap="none">
-            <a:spAutoFit/>
-          </a:bodyPr>
-          <a:lstStyle/>
-          <a:p>
-            <a:pPr algn="ctr"/>
-            <a:r>
-              <a:rPr lang="en-US" sz="1400" dirty="0">
-                <a:latin typeface="Times New Roman" charset="0"/>
-                <a:ea typeface="Times New Roman" charset="0"/>
-                <a:cs typeface="Times New Roman" charset="0"/>
-              </a:rPr>
-              <a:t>    𝜃</a:t>
-            </a:r>
-            <a:r>
-              <a:rPr lang="en-US" sz="1400" baseline="-25000" dirty="0">
-                <a:latin typeface="Times New Roman" charset="0"/>
-                <a:ea typeface="Times New Roman" charset="0"/>
-                <a:cs typeface="Times New Roman" charset="0"/>
-              </a:rPr>
-              <a:t>2</a:t>
-            </a:r>
-            <a:r>
-              <a:rPr lang="en-US" sz="1400" dirty="0">
-                <a:latin typeface="Times New Roman" charset="0"/>
-                <a:ea typeface="Times New Roman" charset="0"/>
-                <a:cs typeface="Times New Roman" charset="0"/>
-              </a:rPr>
-              <a:t>PH</a:t>
-            </a:r>
-          </a:p>
-        </p:txBody>
-      </p:sp>
-      <p:sp>
-        <p:nvSpPr>
-          <p:cNvPr id="31" name="Rectangle 30"/>
-          <p:cNvSpPr/>
-          <p:nvPr/>
-        </p:nvSpPr>
-        <p:spPr>
-          <a:xfrm>
-            <a:off x="6394424" y="2354550"/>
-            <a:ext cx="604654" cy="307777"/>
-          </a:xfrm>
-          <a:prstGeom prst="rect">
-            <a:avLst/>
-          </a:prstGeom>
-        </p:spPr>
-        <p:txBody>
-          <a:bodyPr wrap="none">
-            <a:spAutoFit/>
-          </a:bodyPr>
-          <a:lstStyle/>
-          <a:p>
-            <a:pPr algn="ctr"/>
-            <a:r>
-              <a:rPr lang="en-US" sz="1400" dirty="0">
-                <a:latin typeface="Times New Roman" charset="0"/>
-                <a:ea typeface="Times New Roman" charset="0"/>
-                <a:cs typeface="Times New Roman" charset="0"/>
-              </a:rPr>
-              <a:t>𝜃</a:t>
-            </a:r>
-            <a:r>
-              <a:rPr lang="en-US" sz="1400" baseline="-25000" dirty="0">
-                <a:latin typeface="Times New Roman" charset="0"/>
-                <a:ea typeface="Times New Roman" charset="0"/>
-                <a:cs typeface="Times New Roman" charset="0"/>
-              </a:rPr>
-              <a:t>3</a:t>
-            </a:r>
-            <a:r>
-              <a:rPr lang="en-US" sz="1400" dirty="0">
-                <a:latin typeface="Times New Roman" charset="0"/>
-                <a:ea typeface="Times New Roman" charset="0"/>
-                <a:cs typeface="Times New Roman" charset="0"/>
-              </a:rPr>
-              <a:t>AH</a:t>
-            </a:r>
+              <a:t>𝜈H</a:t>
+            </a:r>
+            <a:endParaRPr lang="en-US" sz="1400" dirty="0">
+              <a:latin typeface="Times New Roman" charset="0"/>
+              <a:ea typeface="Times New Roman" charset="0"/>
+              <a:cs typeface="Times New Roman" charset="0"/>
+            </a:endParaRPr>
           </a:p>
         </p:txBody>
       </p:sp>
       <p:cxnSp>
         <p:nvCxnSpPr>
-          <p:cNvPr id="71" name="Straight Arrow Connector 70"/>
-          <p:cNvCxnSpPr/>
+          <p:cNvPr id="54" name="Straight Arrow Connector 53">
+            <a:extLst>
+              <a:ext uri="{FF2B5EF4-FFF2-40B4-BE49-F238E27FC236}">
+                <a16:creationId xmlns:a16="http://schemas.microsoft.com/office/drawing/2014/main" id="{277C5FF4-9400-724E-B9DD-0FDFB3131763}"/>
+              </a:ext>
+            </a:extLst>
+          </p:cNvPr>
+          <p:cNvCxnSpPr>
+            <a:cxnSpLocks/>
+          </p:cNvCxnSpPr>
           <p:nvPr/>
         </p:nvCxnSpPr>
         <p:spPr>
-          <a:xfrm flipV="1">
-            <a:off x="6018877" y="1866162"/>
-            <a:ext cx="0" cy="346908"/>
+          <a:xfrm>
+            <a:off x="360594" y="2808294"/>
+            <a:ext cx="528955" cy="7808"/>
           </a:xfrm>
           <a:prstGeom prst="straightConnector1">
             <a:avLst/>
@@ -4957,176 +5135,6 @@
           </a:fontRef>
         </p:style>
       </p:cxnSp>
-      <p:cxnSp>
-        <p:nvCxnSpPr>
-          <p:cNvPr id="74" name="Straight Arrow Connector 73"/>
-          <p:cNvCxnSpPr/>
-          <p:nvPr/>
-        </p:nvCxnSpPr>
-        <p:spPr>
-          <a:xfrm flipV="1">
-            <a:off x="5466192" y="3187155"/>
-            <a:ext cx="2390564" cy="1397188"/>
-          </a:xfrm>
-          <a:prstGeom prst="straightConnector1">
-            <a:avLst/>
-          </a:prstGeom>
-          <a:ln w="34925">
-            <a:headEnd type="oval" w="med" len="med"/>
-            <a:tailEnd type="triangle" w="lg" len="lg"/>
-          </a:ln>
-          <a:effectLst/>
-        </p:spPr>
-        <p:style>
-          <a:lnRef idx="2">
-            <a:schemeClr val="accent1"/>
-          </a:lnRef>
-          <a:fillRef idx="0">
-            <a:schemeClr val="accent1"/>
-          </a:fillRef>
-          <a:effectRef idx="1">
-            <a:schemeClr val="accent1"/>
-          </a:effectRef>
-          <a:fontRef idx="minor">
-            <a:schemeClr val="tx1"/>
-          </a:fontRef>
-        </p:style>
-      </p:cxnSp>
-      <p:sp>
-        <p:nvSpPr>
-          <p:cNvPr id="75" name="Rectangle 74"/>
-          <p:cNvSpPr/>
-          <p:nvPr/>
-        </p:nvSpPr>
-        <p:spPr>
-          <a:xfrm>
-            <a:off x="6696751" y="3822359"/>
-            <a:ext cx="532518" cy="307777"/>
-          </a:xfrm>
-          <a:prstGeom prst="rect">
-            <a:avLst/>
-          </a:prstGeom>
-        </p:spPr>
-        <p:txBody>
-          <a:bodyPr wrap="none">
-            <a:spAutoFit/>
-          </a:bodyPr>
-          <a:lstStyle/>
-          <a:p>
-            <a:pPr algn="ctr"/>
-            <a:r>
-              <a:rPr lang="en-US" sz="1400" dirty="0">
-                <a:latin typeface="Times New Roman" charset="0"/>
-                <a:ea typeface="Times New Roman" charset="0"/>
-                <a:cs typeface="Times New Roman" charset="0"/>
-              </a:rPr>
-              <a:t> </a:t>
-            </a:r>
-            <a:r>
-              <a:rPr lang="en-US" sz="1400" dirty="0" err="1">
-                <a:latin typeface="Times New Roman" charset="0"/>
-                <a:ea typeface="Times New Roman" charset="0"/>
-                <a:cs typeface="Times New Roman" charset="0"/>
-              </a:rPr>
-              <a:t>σ</a:t>
-            </a:r>
-            <a:r>
-              <a:rPr lang="en-US" sz="1400" baseline="-25000" dirty="0" err="1">
-                <a:latin typeface="Times New Roman" charset="0"/>
-                <a:ea typeface="Times New Roman" charset="0"/>
-                <a:cs typeface="Times New Roman" charset="0"/>
-              </a:rPr>
-              <a:t>H</a:t>
-            </a:r>
-            <a:r>
-              <a:rPr lang="en-US" sz="1400" dirty="0" err="1">
-                <a:latin typeface="Times New Roman" charset="0"/>
-                <a:ea typeface="Times New Roman" charset="0"/>
-                <a:cs typeface="Times New Roman" charset="0"/>
-              </a:rPr>
-              <a:t>R</a:t>
-            </a:r>
-            <a:endParaRPr lang="en-US" sz="1400" dirty="0">
-              <a:latin typeface="Times New Roman" charset="0"/>
-              <a:ea typeface="Times New Roman" charset="0"/>
-              <a:cs typeface="Times New Roman" charset="0"/>
-            </a:endParaRPr>
-          </a:p>
-        </p:txBody>
-      </p:sp>
-      <p:cxnSp>
-        <p:nvCxnSpPr>
-          <p:cNvPr id="77" name="Straight Arrow Connector 76"/>
-          <p:cNvCxnSpPr/>
-          <p:nvPr/>
-        </p:nvCxnSpPr>
-        <p:spPr>
-          <a:xfrm flipH="1">
-            <a:off x="5405069" y="3155792"/>
-            <a:ext cx="2023350" cy="1148356"/>
-          </a:xfrm>
-          <a:prstGeom prst="straightConnector1">
-            <a:avLst/>
-          </a:prstGeom>
-          <a:ln w="34925">
-            <a:headEnd type="oval" w="med" len="med"/>
-            <a:tailEnd type="triangle" w="lg" len="lg"/>
-          </a:ln>
-          <a:effectLst/>
-        </p:spPr>
-        <p:style>
-          <a:lnRef idx="2">
-            <a:schemeClr val="accent1"/>
-          </a:lnRef>
-          <a:fillRef idx="0">
-            <a:schemeClr val="accent1"/>
-          </a:fillRef>
-          <a:effectRef idx="1">
-            <a:schemeClr val="accent1"/>
-          </a:effectRef>
-          <a:fontRef idx="minor">
-            <a:schemeClr val="tx1"/>
-          </a:fontRef>
-        </p:style>
-      </p:cxnSp>
-      <p:sp>
-        <p:nvSpPr>
-          <p:cNvPr id="82" name="Rectangle 81"/>
-          <p:cNvSpPr/>
-          <p:nvPr/>
-        </p:nvSpPr>
-        <p:spPr>
-          <a:xfrm>
-            <a:off x="6291601" y="3373776"/>
-            <a:ext cx="405880" cy="307777"/>
-          </a:xfrm>
-          <a:prstGeom prst="rect">
-            <a:avLst/>
-          </a:prstGeom>
-        </p:spPr>
-        <p:txBody>
-          <a:bodyPr wrap="none">
-            <a:spAutoFit/>
-          </a:bodyPr>
-          <a:lstStyle/>
-          <a:p>
-            <a:pPr algn="ctr"/>
-            <a:r>
-              <a:rPr lang="en-US" sz="1400">
-                <a:latin typeface="Times New Roman" charset="0"/>
-                <a:ea typeface="Times New Roman" charset="0"/>
-                <a:cs typeface="Times New Roman" charset="0"/>
-              </a:rPr>
-              <a:t>𝜈H</a:t>
-            </a:r>
-            <a:endParaRPr lang="en-US" sz="1400" dirty="0">
-              <a:latin typeface="Times New Roman" charset="0"/>
-              <a:ea typeface="Times New Roman" charset="0"/>
-              <a:cs typeface="Times New Roman" charset="0"/>
-            </a:endParaRPr>
-          </a:p>
-        </p:txBody>
-      </p:sp>
     </p:spTree>
     <p:extLst>
       <p:ext uri="{BB962C8B-B14F-4D97-AF65-F5344CB8AC3E}">

</xml_diff>

<commit_message>
removed delta pathway from model, data for Tennessee/ initial condition info, made compartment heroin+fentanyl,new schematic diagram
</commit_message>
<xml_diff>
--- a/heroin_model_formulation/heroin_schematic.pptx
+++ b/heroin_model_formulation/heroin_schematic.pptx
@@ -301,7 +301,7 @@
           <a:lstStyle/>
           <a:p>
             <a:fld id="{5A3E0873-EA00-D142-ACA6-784333225662}" type="datetimeFigureOut">
-              <a:t>5/23/18</a:t>
+              <a:t>9/1/18</a:t>
             </a:fld>
             <a:endParaRPr lang="en-US"/>
           </a:p>
@@ -467,7 +467,7 @@
           <a:lstStyle/>
           <a:p>
             <a:fld id="{5A3E0873-EA00-D142-ACA6-784333225662}" type="datetimeFigureOut">
-              <a:t>5/23/18</a:t>
+              <a:t>9/1/18</a:t>
             </a:fld>
             <a:endParaRPr lang="en-US"/>
           </a:p>
@@ -643,7 +643,7 @@
           <a:lstStyle/>
           <a:p>
             <a:fld id="{5A3E0873-EA00-D142-ACA6-784333225662}" type="datetimeFigureOut">
-              <a:t>5/23/18</a:t>
+              <a:t>9/1/18</a:t>
             </a:fld>
             <a:endParaRPr lang="en-US"/>
           </a:p>
@@ -809,7 +809,7 @@
           <a:lstStyle/>
           <a:p>
             <a:fld id="{5A3E0873-EA00-D142-ACA6-784333225662}" type="datetimeFigureOut">
-              <a:t>5/23/18</a:t>
+              <a:t>9/1/18</a:t>
             </a:fld>
             <a:endParaRPr lang="en-US"/>
           </a:p>
@@ -1052,7 +1052,7 @@
           <a:lstStyle/>
           <a:p>
             <a:fld id="{5A3E0873-EA00-D142-ACA6-784333225662}" type="datetimeFigureOut">
-              <a:t>5/23/18</a:t>
+              <a:t>9/1/18</a:t>
             </a:fld>
             <a:endParaRPr lang="en-US"/>
           </a:p>
@@ -1335,7 +1335,7 @@
           <a:lstStyle/>
           <a:p>
             <a:fld id="{5A3E0873-EA00-D142-ACA6-784333225662}" type="datetimeFigureOut">
-              <a:t>5/23/18</a:t>
+              <a:t>9/1/18</a:t>
             </a:fld>
             <a:endParaRPr lang="en-US"/>
           </a:p>
@@ -1752,7 +1752,7 @@
           <a:lstStyle/>
           <a:p>
             <a:fld id="{5A3E0873-EA00-D142-ACA6-784333225662}" type="datetimeFigureOut">
-              <a:t>5/23/18</a:t>
+              <a:t>9/1/18</a:t>
             </a:fld>
             <a:endParaRPr lang="en-US"/>
           </a:p>
@@ -1867,7 +1867,7 @@
           <a:lstStyle/>
           <a:p>
             <a:fld id="{5A3E0873-EA00-D142-ACA6-784333225662}" type="datetimeFigureOut">
-              <a:t>5/23/18</a:t>
+              <a:t>9/1/18</a:t>
             </a:fld>
             <a:endParaRPr lang="en-US"/>
           </a:p>
@@ -1960,7 +1960,7 @@
           <a:lstStyle/>
           <a:p>
             <a:fld id="{5A3E0873-EA00-D142-ACA6-784333225662}" type="datetimeFigureOut">
-              <a:t>5/23/18</a:t>
+              <a:t>9/1/18</a:t>
             </a:fld>
             <a:endParaRPr lang="en-US"/>
           </a:p>
@@ -2233,7 +2233,7 @@
           <a:lstStyle/>
           <a:p>
             <a:fld id="{5A3E0873-EA00-D142-ACA6-784333225662}" type="datetimeFigureOut">
-              <a:t>5/23/18</a:t>
+              <a:t>9/1/18</a:t>
             </a:fld>
             <a:endParaRPr lang="en-US"/>
           </a:p>
@@ -2483,7 +2483,7 @@
           <a:lstStyle/>
           <a:p>
             <a:fld id="{5A3E0873-EA00-D142-ACA6-784333225662}" type="datetimeFigureOut">
-              <a:t>5/23/18</a:t>
+              <a:t>9/1/18</a:t>
             </a:fld>
             <a:endParaRPr lang="en-US"/>
           </a:p>
@@ -2692,7 +2692,7 @@
           </a:lstStyle>
           <a:p>
             <a:fld id="{5A3E0873-EA00-D142-ACA6-784333225662}" type="datetimeFigureOut">
-              <a:t>5/23/18</a:t>
+              <a:t>9/1/18</a:t>
             </a:fld>
             <a:endParaRPr lang="en-US"/>
           </a:p>
@@ -3178,7 +3178,7 @@
         </p:nvGrpSpPr>
         <p:grpSpPr>
           <a:xfrm>
-            <a:off x="5258411" y="2306803"/>
+            <a:off x="5099950" y="2340019"/>
             <a:ext cx="1033190" cy="742569"/>
             <a:chOff x="1861895" y="2292278"/>
             <a:chExt cx="1033190" cy="742569"/>
@@ -3282,7 +3282,7 @@
         </p:nvGrpSpPr>
         <p:grpSpPr>
           <a:xfrm>
-            <a:off x="4183853" y="4002556"/>
+            <a:off x="6199983" y="3998363"/>
             <a:ext cx="1127949" cy="742569"/>
             <a:chOff x="1861895" y="2292278"/>
             <a:chExt cx="1033190" cy="742569"/>
@@ -3386,7 +3386,7 @@
         </p:nvGrpSpPr>
         <p:grpSpPr>
           <a:xfrm>
-            <a:off x="3213907" y="2318910"/>
+            <a:off x="3082880" y="2330260"/>
             <a:ext cx="1033190" cy="742569"/>
             <a:chOff x="1861895" y="2292278"/>
             <a:chExt cx="1033190" cy="742569"/>
@@ -3485,13 +3485,15 @@
       <p:cxnSp>
         <p:nvCxnSpPr>
           <p:cNvPr id="20" name="Straight Arrow Connector 19"/>
-          <p:cNvCxnSpPr/>
+          <p:cNvCxnSpPr>
+            <a:cxnSpLocks/>
+          </p:cNvCxnSpPr>
           <p:nvPr/>
         </p:nvCxnSpPr>
         <p:spPr>
           <a:xfrm>
-            <a:off x="2237182" y="2549912"/>
-            <a:ext cx="839467" cy="0"/>
+            <a:off x="2227987" y="2549912"/>
+            <a:ext cx="759952" cy="0"/>
           </a:xfrm>
           <a:prstGeom prst="straightConnector1">
             <a:avLst/>
@@ -3520,13 +3522,15 @@
       <p:cxnSp>
         <p:nvCxnSpPr>
           <p:cNvPr id="21" name="Straight Arrow Connector 20"/>
-          <p:cNvCxnSpPr/>
+          <p:cNvCxnSpPr>
+            <a:cxnSpLocks/>
+          </p:cNvCxnSpPr>
           <p:nvPr/>
         </p:nvCxnSpPr>
         <p:spPr>
           <a:xfrm>
-            <a:off x="2014357" y="2792782"/>
-            <a:ext cx="839467" cy="0"/>
+            <a:off x="2068999" y="2808294"/>
+            <a:ext cx="735211" cy="7808"/>
           </a:xfrm>
           <a:prstGeom prst="straightConnector1">
             <a:avLst/>
@@ -3558,192 +3562,6 @@
           </a:fontRef>
         </p:style>
       </p:cxnSp>
-      <p:cxnSp>
-        <p:nvCxnSpPr>
-          <p:cNvPr id="22" name="Straight Arrow Connector 21"/>
-          <p:cNvCxnSpPr/>
-          <p:nvPr/>
-        </p:nvCxnSpPr>
-        <p:spPr>
-          <a:xfrm flipV="1">
-            <a:off x="4416033" y="2659548"/>
-            <a:ext cx="772636" cy="5559"/>
-          </a:xfrm>
-          <a:prstGeom prst="straightConnector1">
-            <a:avLst/>
-          </a:prstGeom>
-          <a:ln w="34925">
-            <a:headEnd type="oval" w="med" len="med"/>
-            <a:tailEnd type="triangle" w="lg" len="lg"/>
-          </a:ln>
-          <a:effectLst/>
-        </p:spPr>
-        <p:style>
-          <a:lnRef idx="2">
-            <a:schemeClr val="accent1"/>
-          </a:lnRef>
-          <a:fillRef idx="0">
-            <a:schemeClr val="accent1"/>
-          </a:fillRef>
-          <a:effectRef idx="1">
-            <a:schemeClr val="accent1"/>
-          </a:effectRef>
-          <a:fontRef idx="minor">
-            <a:schemeClr val="tx1"/>
-          </a:fontRef>
-        </p:style>
-      </p:cxnSp>
-      <p:cxnSp>
-        <p:nvCxnSpPr>
-          <p:cNvPr id="23" name="Straight Arrow Connector 22"/>
-          <p:cNvCxnSpPr/>
-          <p:nvPr/>
-        </p:nvCxnSpPr>
-        <p:spPr>
-          <a:xfrm flipH="1" flipV="1">
-            <a:off x="1698142" y="3150095"/>
-            <a:ext cx="2329277" cy="1221850"/>
-          </a:xfrm>
-          <a:prstGeom prst="straightConnector1">
-            <a:avLst/>
-          </a:prstGeom>
-          <a:ln w="34925">
-            <a:headEnd type="oval" w="med" len="med"/>
-            <a:tailEnd type="triangle" w="lg" len="lg"/>
-          </a:ln>
-          <a:effectLst/>
-        </p:spPr>
-        <p:style>
-          <a:lnRef idx="2">
-            <a:schemeClr val="accent1"/>
-          </a:lnRef>
-          <a:fillRef idx="0">
-            <a:schemeClr val="accent1"/>
-          </a:fillRef>
-          <a:effectRef idx="1">
-            <a:schemeClr val="accent1"/>
-          </a:effectRef>
-          <a:fontRef idx="minor">
-            <a:schemeClr val="tx1"/>
-          </a:fontRef>
-        </p:style>
-      </p:cxnSp>
-      <p:cxnSp>
-        <p:nvCxnSpPr>
-          <p:cNvPr id="25" name="Straight Arrow Connector 24"/>
-          <p:cNvCxnSpPr/>
-          <p:nvPr/>
-        </p:nvCxnSpPr>
-        <p:spPr>
-          <a:xfrm flipV="1">
-            <a:off x="5292209" y="3150095"/>
-            <a:ext cx="440452" cy="748230"/>
-          </a:xfrm>
-          <a:prstGeom prst="straightConnector1">
-            <a:avLst/>
-          </a:prstGeom>
-          <a:ln w="34925">
-            <a:headEnd type="oval" w="med" len="med"/>
-            <a:tailEnd type="triangle" w="lg" len="lg"/>
-          </a:ln>
-          <a:effectLst/>
-        </p:spPr>
-        <p:style>
-          <a:lnRef idx="2">
-            <a:schemeClr val="accent1"/>
-          </a:lnRef>
-          <a:fillRef idx="0">
-            <a:schemeClr val="accent1"/>
-          </a:fillRef>
-          <a:effectRef idx="1">
-            <a:schemeClr val="accent1"/>
-          </a:effectRef>
-          <a:fontRef idx="minor">
-            <a:schemeClr val="tx1"/>
-          </a:fontRef>
-        </p:style>
-      </p:cxnSp>
-      <p:cxnSp>
-        <p:nvCxnSpPr>
-          <p:cNvPr id="28" name="Straight Arrow Connector 27"/>
-          <p:cNvCxnSpPr/>
-          <p:nvPr/>
-        </p:nvCxnSpPr>
-        <p:spPr>
-          <a:xfrm flipH="1">
-            <a:off x="5013155" y="3193429"/>
-            <a:ext cx="458553" cy="729620"/>
-          </a:xfrm>
-          <a:prstGeom prst="straightConnector1">
-            <a:avLst/>
-          </a:prstGeom>
-          <a:ln w="34925">
-            <a:headEnd type="oval" w="med" len="med"/>
-            <a:tailEnd type="triangle" w="lg" len="lg"/>
-          </a:ln>
-          <a:effectLst/>
-        </p:spPr>
-        <p:style>
-          <a:lnRef idx="2">
-            <a:schemeClr val="accent1"/>
-          </a:lnRef>
-          <a:fillRef idx="0">
-            <a:schemeClr val="accent1"/>
-          </a:fillRef>
-          <a:effectRef idx="1">
-            <a:schemeClr val="accent1"/>
-          </a:effectRef>
-          <a:fontRef idx="minor">
-            <a:schemeClr val="tx1"/>
-          </a:fontRef>
-        </p:style>
-      </p:cxnSp>
-      <p:sp>
-        <p:nvSpPr>
-          <p:cNvPr id="36" name="Arc 35"/>
-          <p:cNvSpPr/>
-          <p:nvPr/>
-        </p:nvSpPr>
-        <p:spPr>
-          <a:xfrm rot="19175766">
-            <a:off x="506806" y="1227190"/>
-            <a:ext cx="6375996" cy="6645018"/>
-          </a:xfrm>
-          <a:prstGeom prst="arc">
-            <a:avLst>
-              <a:gd name="adj1" fmla="val 16051718"/>
-              <a:gd name="adj2" fmla="val 21133418"/>
-            </a:avLst>
-          </a:prstGeom>
-          <a:ln w="34925">
-            <a:headEnd type="oval"/>
-            <a:tailEnd type="triangle" w="lg" len="lg"/>
-          </a:ln>
-          <a:effectLst/>
-        </p:spPr>
-        <p:style>
-          <a:lnRef idx="2">
-            <a:schemeClr val="accent1"/>
-          </a:lnRef>
-          <a:fillRef idx="0">
-            <a:schemeClr val="accent1"/>
-          </a:fillRef>
-          <a:effectRef idx="1">
-            <a:schemeClr val="accent1"/>
-          </a:effectRef>
-          <a:fontRef idx="minor">
-            <a:schemeClr val="tx1"/>
-          </a:fontRef>
-        </p:style>
-        <p:txBody>
-          <a:bodyPr rtlCol="0" anchor="ctr"/>
-          <a:lstStyle/>
-          <a:p>
-            <a:pPr algn="ctr"/>
-            <a:endParaRPr lang="en-US"/>
-          </a:p>
-        </p:txBody>
-      </p:sp>
       <p:cxnSp>
         <p:nvCxnSpPr>
           <p:cNvPr id="38" name="Straight Arrow Connector 37"/>
@@ -3792,7 +3610,7 @@
         </p:nvCxnSpPr>
         <p:spPr>
           <a:xfrm>
-            <a:off x="4747827" y="4860616"/>
+            <a:off x="6779029" y="4889483"/>
             <a:ext cx="0" cy="453223"/>
           </a:xfrm>
           <a:prstGeom prst="straightConnector1">
@@ -3827,13 +3645,15 @@
       <p:cxnSp>
         <p:nvCxnSpPr>
           <p:cNvPr id="51" name="Straight Arrow Connector 50"/>
-          <p:cNvCxnSpPr/>
+          <p:cNvCxnSpPr>
+            <a:cxnSpLocks/>
+          </p:cNvCxnSpPr>
           <p:nvPr/>
         </p:nvCxnSpPr>
         <p:spPr>
-          <a:xfrm flipV="1">
-            <a:off x="4168306" y="1866162"/>
-            <a:ext cx="0" cy="346908"/>
+          <a:xfrm>
+            <a:off x="3646844" y="3229136"/>
+            <a:ext cx="0" cy="417438"/>
           </a:xfrm>
           <a:prstGeom prst="straightConnector1">
             <a:avLst/>
@@ -3872,7 +3692,7 @@
         </p:nvSpPr>
         <p:spPr>
           <a:xfrm>
-            <a:off x="3083906" y="981836"/>
+            <a:off x="2845344" y="1147328"/>
             <a:ext cx="1076241" cy="307777"/>
           </a:xfrm>
           <a:prstGeom prst="rect">
@@ -3940,7 +3760,7 @@
         </p:nvSpPr>
         <p:spPr>
           <a:xfrm>
-            <a:off x="2227988" y="2159714"/>
+            <a:off x="2178245" y="2209109"/>
             <a:ext cx="839466" cy="307777"/>
           </a:xfrm>
           <a:prstGeom prst="rect">
@@ -3974,7 +3794,7 @@
         </p:nvSpPr>
         <p:spPr>
           <a:xfrm>
-            <a:off x="2234517" y="2840702"/>
+            <a:off x="2211300" y="2890716"/>
             <a:ext cx="839467" cy="307777"/>
           </a:xfrm>
           <a:prstGeom prst="rect">
@@ -4008,7 +3828,7 @@
         </p:nvSpPr>
         <p:spPr>
           <a:xfrm>
-            <a:off x="4375896" y="2375797"/>
+            <a:off x="4148183" y="2334498"/>
             <a:ext cx="839466" cy="307777"/>
           </a:xfrm>
           <a:prstGeom prst="rect">
@@ -4042,7 +3862,7 @@
         </p:nvSpPr>
         <p:spPr>
           <a:xfrm>
-            <a:off x="4533459" y="3365864"/>
+            <a:off x="5317845" y="3436851"/>
             <a:ext cx="839466" cy="307777"/>
           </a:xfrm>
           <a:prstGeom prst="rect">
@@ -4076,7 +3896,7 @@
         </p:nvSpPr>
         <p:spPr>
           <a:xfrm>
-            <a:off x="5188669" y="3390588"/>
+            <a:off x="5839252" y="3201332"/>
             <a:ext cx="1160612" cy="307777"/>
           </a:xfrm>
           <a:prstGeom prst="rect">
@@ -4133,47 +3953,13 @@
       </p:sp>
       <p:sp>
         <p:nvSpPr>
-          <p:cNvPr id="66" name="TextBox 65"/>
-          <p:cNvSpPr txBox="1"/>
-          <p:nvPr/>
-        </p:nvSpPr>
-        <p:spPr>
-          <a:xfrm>
-            <a:off x="2424385" y="3782999"/>
-            <a:ext cx="839466" cy="307777"/>
-          </a:xfrm>
-          <a:prstGeom prst="rect">
-            <a:avLst/>
-          </a:prstGeom>
-          <a:noFill/>
-        </p:spPr>
-        <p:txBody>
-          <a:bodyPr wrap="square" rtlCol="0">
-            <a:spAutoFit/>
-          </a:bodyPr>
-          <a:lstStyle/>
-          <a:p>
-            <a:pPr algn="ctr"/>
-            <a:r>
-              <a:rPr lang="en-US" sz="1400" dirty="0">
-                <a:latin typeface="Times New Roman" charset="0"/>
-                <a:ea typeface="Times New Roman" charset="0"/>
-                <a:cs typeface="Times New Roman" charset="0"/>
-              </a:rPr>
-              <a:t>δR</a:t>
-            </a:r>
-          </a:p>
-        </p:txBody>
-      </p:sp>
-      <p:sp>
-        <p:nvSpPr>
           <p:cNvPr id="67" name="TextBox 66"/>
           <p:cNvSpPr txBox="1"/>
           <p:nvPr/>
         </p:nvSpPr>
         <p:spPr>
           <a:xfrm>
-            <a:off x="4140799" y="1932085"/>
+            <a:off x="3050767" y="3204347"/>
             <a:ext cx="550468" cy="307777"/>
           </a:xfrm>
           <a:prstGeom prst="rect">
@@ -4207,7 +3993,7 @@
         </p:nvSpPr>
         <p:spPr>
           <a:xfrm>
-            <a:off x="4152027" y="4879715"/>
+            <a:off x="6106962" y="4949161"/>
             <a:ext cx="721080" cy="307777"/>
           </a:xfrm>
           <a:prstGeom prst="rect">
@@ -4241,7 +4027,7 @@
         </p:nvSpPr>
         <p:spPr>
           <a:xfrm>
-            <a:off x="6009968" y="1935202"/>
+            <a:off x="5750164" y="1958559"/>
             <a:ext cx="989110" cy="307777"/>
           </a:xfrm>
           <a:prstGeom prst="rect">
@@ -4303,7 +4089,7 @@
         </p:nvSpPr>
         <p:spPr>
           <a:xfrm>
-            <a:off x="3255802" y="1280154"/>
+            <a:off x="2987939" y="1466151"/>
             <a:ext cx="721080" cy="307777"/>
           </a:xfrm>
           <a:prstGeom prst="rect">
@@ -4428,7 +4214,7 @@
         </p:nvSpPr>
         <p:spPr>
           <a:xfrm>
-            <a:off x="7213942" y="2307723"/>
+            <a:off x="7134687" y="2317292"/>
             <a:ext cx="1033190" cy="742569"/>
           </a:xfrm>
           <a:prstGeom prst="rect">
@@ -4482,7 +4268,7 @@
         </p:nvSpPr>
         <p:spPr>
           <a:xfrm>
-            <a:off x="7307439" y="2410229"/>
+            <a:off x="7221728" y="2408838"/>
             <a:ext cx="871755" cy="523220"/>
           </a:xfrm>
           <a:prstGeom prst="rect">
@@ -4515,19 +4301,24 @@
       </p:sp>
       <p:cxnSp>
         <p:nvCxnSpPr>
-          <p:cNvPr id="45" name="Straight Arrow Connector 44"/>
+          <p:cNvPr id="50" name="Straight Arrow Connector 49"/>
           <p:cNvCxnSpPr/>
           <p:nvPr/>
         </p:nvCxnSpPr>
         <p:spPr>
-          <a:xfrm flipV="1">
-            <a:off x="6467502" y="2642275"/>
-            <a:ext cx="649631" cy="17274"/>
+          <a:xfrm>
+            <a:off x="8313885" y="2707791"/>
+            <a:ext cx="547042" cy="1162"/>
           </a:xfrm>
           <a:prstGeom prst="straightConnector1">
             <a:avLst/>
           </a:prstGeom>
           <a:ln w="34925">
+            <a:solidFill>
+              <a:schemeClr val="accent2">
+                <a:lumMod val="75000"/>
+              </a:schemeClr>
+            </a:solidFill>
             <a:headEnd type="oval" w="med" len="med"/>
             <a:tailEnd type="triangle" w="lg" len="lg"/>
           </a:ln>
@@ -4548,27 +4339,75 @@
           </a:fontRef>
         </p:style>
       </p:cxnSp>
-      <p:cxnSp>
-        <p:nvCxnSpPr>
-          <p:cNvPr id="50" name="Straight Arrow Connector 49"/>
-          <p:cNvCxnSpPr/>
+      <p:sp>
+        <p:nvSpPr>
+          <p:cNvPr id="70" name="TextBox 69"/>
+          <p:cNvSpPr txBox="1"/>
           <p:nvPr/>
-        </p:nvCxnSpPr>
-        <p:spPr>
-          <a:xfrm>
-            <a:off x="8394058" y="2642275"/>
-            <a:ext cx="547042" cy="1162"/>
-          </a:xfrm>
-          <a:prstGeom prst="straightConnector1">
+        </p:nvSpPr>
+        <p:spPr>
+          <a:xfrm>
+            <a:off x="8183248" y="2819831"/>
+            <a:ext cx="879373" cy="307777"/>
+          </a:xfrm>
+          <a:prstGeom prst="rect">
             <a:avLst/>
           </a:prstGeom>
+          <a:noFill/>
+        </p:spPr>
+        <p:txBody>
+          <a:bodyPr wrap="square" rtlCol="0">
+            <a:spAutoFit/>
+          </a:bodyPr>
+          <a:lstStyle/>
+          <a:p>
+            <a:pPr algn="ctr"/>
+            <a:r>
+              <a:rPr lang="en-US" sz="1400" dirty="0">
+                <a:latin typeface="Times New Roman" charset="0"/>
+                <a:ea typeface="Times New Roman" charset="0"/>
+                <a:cs typeface="Times New Roman" charset="0"/>
+              </a:rPr>
+              <a:t>(𝜇 +𝜇</a:t>
+            </a:r>
+            <a:r>
+              <a:rPr lang="en-US" sz="1400" baseline="-25000" dirty="0">
+                <a:latin typeface="Times New Roman" charset="0"/>
+                <a:ea typeface="Times New Roman" charset="0"/>
+                <a:cs typeface="Times New Roman" charset="0"/>
+              </a:rPr>
+              <a:t>H</a:t>
+            </a:r>
+            <a:r>
+              <a:rPr lang="en-US" sz="1400" dirty="0">
+                <a:latin typeface="Times New Roman" charset="0"/>
+                <a:ea typeface="Times New Roman" charset="0"/>
+                <a:cs typeface="Times New Roman" charset="0"/>
+              </a:rPr>
+              <a:t>)H</a:t>
+            </a:r>
+          </a:p>
+        </p:txBody>
+      </p:sp>
+      <p:sp>
+        <p:nvSpPr>
+          <p:cNvPr id="72" name="Arc 71"/>
+          <p:cNvSpPr/>
+          <p:nvPr/>
+        </p:nvSpPr>
+        <p:spPr>
+          <a:xfrm rot="19175766">
+            <a:off x="662469" y="350528"/>
+            <a:ext cx="8065547" cy="8538591"/>
+          </a:xfrm>
+          <a:prstGeom prst="arc">
+            <a:avLst>
+              <a:gd name="adj1" fmla="val 15396066"/>
+              <a:gd name="adj2" fmla="val 201989"/>
+            </a:avLst>
+          </a:prstGeom>
           <a:ln w="34925">
-            <a:solidFill>
-              <a:schemeClr val="accent2">
-                <a:lumMod val="75000"/>
-              </a:schemeClr>
-            </a:solidFill>
-            <a:headEnd type="oval" w="med" len="med"/>
+            <a:headEnd type="oval"/>
             <a:tailEnd type="triangle" w="lg" len="lg"/>
           </a:ln>
           <a:effectLst/>
@@ -4587,140 +4426,6 @@
             <a:schemeClr val="tx1"/>
           </a:fontRef>
         </p:style>
-      </p:cxnSp>
-      <p:sp>
-        <p:nvSpPr>
-          <p:cNvPr id="53" name="Arc 52"/>
-          <p:cNvSpPr/>
-          <p:nvPr/>
-        </p:nvSpPr>
-        <p:spPr>
-          <a:xfrm rot="19175766">
-            <a:off x="2635321" y="1299700"/>
-            <a:ext cx="6375996" cy="6645018"/>
-          </a:xfrm>
-          <a:prstGeom prst="arc">
-            <a:avLst>
-              <a:gd name="adj1" fmla="val 16051718"/>
-              <a:gd name="adj2" fmla="val 21038730"/>
-            </a:avLst>
-          </a:prstGeom>
-          <a:ln w="34925">
-            <a:headEnd type="oval"/>
-            <a:tailEnd type="triangle" w="lg" len="lg"/>
-          </a:ln>
-          <a:effectLst/>
-        </p:spPr>
-        <p:style>
-          <a:lnRef idx="2">
-            <a:schemeClr val="accent1"/>
-          </a:lnRef>
-          <a:fillRef idx="0">
-            <a:schemeClr val="accent1"/>
-          </a:fillRef>
-          <a:effectRef idx="1">
-            <a:schemeClr val="accent1"/>
-          </a:effectRef>
-          <a:fontRef idx="minor">
-            <a:schemeClr val="tx1"/>
-          </a:fontRef>
-        </p:style>
-        <p:txBody>
-          <a:bodyPr rtlCol="0" anchor="ctr"/>
-          <a:lstStyle/>
-          <a:p>
-            <a:pPr algn="ctr"/>
-            <a:endParaRPr lang="en-US"/>
-          </a:p>
-        </p:txBody>
-      </p:sp>
-      <p:sp>
-        <p:nvSpPr>
-          <p:cNvPr id="70" name="TextBox 69"/>
-          <p:cNvSpPr txBox="1"/>
-          <p:nvPr/>
-        </p:nvSpPr>
-        <p:spPr>
-          <a:xfrm>
-            <a:off x="8244149" y="2722525"/>
-            <a:ext cx="879373" cy="307777"/>
-          </a:xfrm>
-          <a:prstGeom prst="rect">
-            <a:avLst/>
-          </a:prstGeom>
-          <a:noFill/>
-        </p:spPr>
-        <p:txBody>
-          <a:bodyPr wrap="square" rtlCol="0">
-            <a:spAutoFit/>
-          </a:bodyPr>
-          <a:lstStyle/>
-          <a:p>
-            <a:pPr algn="ctr"/>
-            <a:r>
-              <a:rPr lang="en-US" sz="1400" dirty="0">
-                <a:latin typeface="Times New Roman" charset="0"/>
-                <a:ea typeface="Times New Roman" charset="0"/>
-                <a:cs typeface="Times New Roman" charset="0"/>
-              </a:rPr>
-              <a:t>(𝜇 +𝜇</a:t>
-            </a:r>
-            <a:r>
-              <a:rPr lang="en-US" sz="1400" baseline="-25000" dirty="0">
-                <a:latin typeface="Times New Roman" charset="0"/>
-                <a:ea typeface="Times New Roman" charset="0"/>
-                <a:cs typeface="Times New Roman" charset="0"/>
-              </a:rPr>
-              <a:t>H</a:t>
-            </a:r>
-            <a:r>
-              <a:rPr lang="en-US" sz="1400" dirty="0">
-                <a:latin typeface="Times New Roman" charset="0"/>
-                <a:ea typeface="Times New Roman" charset="0"/>
-                <a:cs typeface="Times New Roman" charset="0"/>
-              </a:rPr>
-              <a:t>)H</a:t>
-            </a:r>
-          </a:p>
-        </p:txBody>
-      </p:sp>
-      <p:sp>
-        <p:nvSpPr>
-          <p:cNvPr id="72" name="Arc 71"/>
-          <p:cNvSpPr/>
-          <p:nvPr/>
-        </p:nvSpPr>
-        <p:spPr>
-          <a:xfrm rot="19175766">
-            <a:off x="627268" y="305942"/>
-            <a:ext cx="8221918" cy="8487514"/>
-          </a:xfrm>
-          <a:prstGeom prst="arc">
-            <a:avLst>
-              <a:gd name="adj1" fmla="val 15338255"/>
-              <a:gd name="adj2" fmla="val 294909"/>
-            </a:avLst>
-          </a:prstGeom>
-          <a:ln w="34925">
-            <a:headEnd type="oval"/>
-            <a:tailEnd type="triangle" w="lg" len="lg"/>
-          </a:ln>
-          <a:effectLst/>
-        </p:spPr>
-        <p:style>
-          <a:lnRef idx="2">
-            <a:schemeClr val="accent1"/>
-          </a:lnRef>
-          <a:fillRef idx="0">
-            <a:schemeClr val="accent1"/>
-          </a:fillRef>
-          <a:effectRef idx="1">
-            <a:schemeClr val="accent1"/>
-          </a:effectRef>
-          <a:fontRef idx="minor">
-            <a:schemeClr val="tx1"/>
-          </a:fontRef>
-        </p:style>
         <p:txBody>
           <a:bodyPr rtlCol="0" anchor="ctr"/>
           <a:lstStyle/>
@@ -4738,7 +4443,7 @@
         </p:nvSpPr>
         <p:spPr>
           <a:xfrm>
-            <a:off x="4232644" y="72543"/>
+            <a:off x="4105170" y="127046"/>
             <a:ext cx="753732" cy="307777"/>
           </a:xfrm>
           <a:prstGeom prst="rect">
@@ -4787,7 +4492,7 @@
         </p:nvSpPr>
         <p:spPr>
           <a:xfrm>
-            <a:off x="5471708" y="1054850"/>
+            <a:off x="5477328" y="1165171"/>
             <a:ext cx="753732" cy="307777"/>
           </a:xfrm>
           <a:prstGeom prst="rect">
@@ -4836,7 +4541,7 @@
         </p:nvSpPr>
         <p:spPr>
           <a:xfrm>
-            <a:off x="6394424" y="2354550"/>
+            <a:off x="6334470" y="2413198"/>
             <a:ext cx="604654" cy="307777"/>
           </a:xfrm>
           <a:prstGeom prst="rect">
@@ -4885,7 +4590,7 @@
         </p:nvCxnSpPr>
         <p:spPr>
           <a:xfrm flipV="1">
-            <a:off x="6018877" y="1866162"/>
+            <a:off x="5711915" y="1862201"/>
             <a:ext cx="0" cy="346908"/>
           </a:xfrm>
           <a:prstGeom prst="straightConnector1">
@@ -4920,13 +4625,15 @@
       <p:cxnSp>
         <p:nvCxnSpPr>
           <p:cNvPr id="74" name="Straight Arrow Connector 73"/>
-          <p:cNvCxnSpPr/>
+          <p:cNvCxnSpPr>
+            <a:cxnSpLocks/>
+          </p:cNvCxnSpPr>
           <p:nvPr/>
         </p:nvCxnSpPr>
         <p:spPr>
           <a:xfrm flipV="1">
-            <a:off x="5466192" y="3187155"/>
-            <a:ext cx="2390564" cy="1397188"/>
+            <a:off x="7391852" y="3153954"/>
+            <a:ext cx="380832" cy="702389"/>
           </a:xfrm>
           <a:prstGeom prst="straightConnector1">
             <a:avLst/>
@@ -4960,7 +4667,7 @@
         </p:nvSpPr>
         <p:spPr>
           <a:xfrm>
-            <a:off x="6696751" y="3822359"/>
+            <a:off x="7539379" y="3429441"/>
             <a:ext cx="532518" cy="307777"/>
           </a:xfrm>
           <a:prstGeom prst="rect">
@@ -5017,13 +4724,15 @@
       <p:cxnSp>
         <p:nvCxnSpPr>
           <p:cNvPr id="77" name="Straight Arrow Connector 76"/>
-          <p:cNvCxnSpPr/>
+          <p:cNvCxnSpPr>
+            <a:cxnSpLocks/>
+          </p:cNvCxnSpPr>
           <p:nvPr/>
         </p:nvCxnSpPr>
         <p:spPr>
           <a:xfrm flipH="1">
-            <a:off x="5405069" y="3155792"/>
-            <a:ext cx="2023350" cy="1148356"/>
+            <a:off x="7126387" y="3229136"/>
+            <a:ext cx="308127" cy="627207"/>
           </a:xfrm>
           <a:prstGeom prst="straightConnector1">
             <a:avLst/>
@@ -5057,7 +4766,7 @@
         </p:nvSpPr>
         <p:spPr>
           <a:xfrm>
-            <a:off x="6291601" y="3373776"/>
+            <a:off x="6959960" y="3197787"/>
             <a:ext cx="405880" cy="307777"/>
           </a:xfrm>
           <a:prstGeom prst="rect">
@@ -5072,18 +4781,13 @@
           <a:p>
             <a:pPr algn="ctr"/>
             <a:r>
-              <a:rPr lang="en-US" sz="1400">
+              <a:rPr lang="en-US" sz="1400" dirty="0">
                 <a:latin typeface="Times New Roman" charset="0"/>
                 <a:ea typeface="Times New Roman" charset="0"/>
                 <a:cs typeface="Times New Roman" charset="0"/>
               </a:rPr>
               <a:t>𝜈H</a:t>
             </a:r>
-            <a:endParaRPr lang="en-US" sz="1400" dirty="0">
-              <a:latin typeface="Times New Roman" charset="0"/>
-              <a:ea typeface="Times New Roman" charset="0"/>
-              <a:cs typeface="Times New Roman" charset="0"/>
-            </a:endParaRPr>
           </a:p>
         </p:txBody>
       </p:sp>
@@ -5115,6 +4819,282 @@
                 <a:lumMod val="75000"/>
               </a:schemeClr>
             </a:solidFill>
+            <a:headEnd type="oval" w="med" len="med"/>
+            <a:tailEnd type="triangle" w="lg" len="lg"/>
+          </a:ln>
+          <a:effectLst/>
+        </p:spPr>
+        <p:style>
+          <a:lnRef idx="2">
+            <a:schemeClr val="accent1"/>
+          </a:lnRef>
+          <a:fillRef idx="0">
+            <a:schemeClr val="accent1"/>
+          </a:fillRef>
+          <a:effectRef idx="1">
+            <a:schemeClr val="accent1"/>
+          </a:effectRef>
+          <a:fontRef idx="minor">
+            <a:schemeClr val="tx1"/>
+          </a:fontRef>
+        </p:style>
+      </p:cxnSp>
+      <p:cxnSp>
+        <p:nvCxnSpPr>
+          <p:cNvPr id="60" name="Straight Arrow Connector 59">
+            <a:extLst>
+              <a:ext uri="{FF2B5EF4-FFF2-40B4-BE49-F238E27FC236}">
+                <a16:creationId xmlns:a16="http://schemas.microsoft.com/office/drawing/2014/main" id="{1D05174E-617B-EC4F-888D-624BA3B4C4ED}"/>
+              </a:ext>
+            </a:extLst>
+          </p:cNvPr>
+          <p:cNvCxnSpPr>
+            <a:cxnSpLocks/>
+          </p:cNvCxnSpPr>
+          <p:nvPr/>
+        </p:nvCxnSpPr>
+        <p:spPr>
+          <a:xfrm flipH="1" flipV="1">
+            <a:off x="5693543" y="3200676"/>
+            <a:ext cx="545515" cy="624312"/>
+          </a:xfrm>
+          <a:prstGeom prst="straightConnector1">
+            <a:avLst/>
+          </a:prstGeom>
+          <a:ln w="34925">
+            <a:headEnd type="oval" w="med" len="med"/>
+            <a:tailEnd type="triangle" w="lg" len="lg"/>
+          </a:ln>
+          <a:effectLst/>
+        </p:spPr>
+        <p:style>
+          <a:lnRef idx="2">
+            <a:schemeClr val="accent1"/>
+          </a:lnRef>
+          <a:fillRef idx="0">
+            <a:schemeClr val="accent1"/>
+          </a:fillRef>
+          <a:effectRef idx="1">
+            <a:schemeClr val="accent1"/>
+          </a:effectRef>
+          <a:fontRef idx="minor">
+            <a:schemeClr val="tx1"/>
+          </a:fontRef>
+        </p:style>
+      </p:cxnSp>
+      <p:cxnSp>
+        <p:nvCxnSpPr>
+          <p:cNvPr id="76" name="Straight Arrow Connector 75">
+            <a:extLst>
+              <a:ext uri="{FF2B5EF4-FFF2-40B4-BE49-F238E27FC236}">
+                <a16:creationId xmlns:a16="http://schemas.microsoft.com/office/drawing/2014/main" id="{046BBD7E-2E1A-8C41-9B2A-742C9E857CEB}"/>
+              </a:ext>
+            </a:extLst>
+          </p:cNvPr>
+          <p:cNvCxnSpPr>
+            <a:cxnSpLocks/>
+          </p:cNvCxnSpPr>
+          <p:nvPr/>
+        </p:nvCxnSpPr>
+        <p:spPr>
+          <a:xfrm>
+            <a:off x="6000795" y="3190917"/>
+            <a:ext cx="503728" cy="619261"/>
+          </a:xfrm>
+          <a:prstGeom prst="straightConnector1">
+            <a:avLst/>
+          </a:prstGeom>
+          <a:ln w="34925">
+            <a:headEnd type="oval" w="med" len="med"/>
+            <a:tailEnd type="triangle" w="lg" len="lg"/>
+          </a:ln>
+          <a:effectLst/>
+        </p:spPr>
+        <p:style>
+          <a:lnRef idx="2">
+            <a:schemeClr val="accent1"/>
+          </a:lnRef>
+          <a:fillRef idx="0">
+            <a:schemeClr val="accent1"/>
+          </a:fillRef>
+          <a:effectRef idx="1">
+            <a:schemeClr val="accent1"/>
+          </a:effectRef>
+          <a:fontRef idx="minor">
+            <a:schemeClr val="tx1"/>
+          </a:fontRef>
+        </p:style>
+      </p:cxnSp>
+      <p:sp>
+        <p:nvSpPr>
+          <p:cNvPr id="52" name="Arc 51">
+            <a:extLst>
+              <a:ext uri="{FF2B5EF4-FFF2-40B4-BE49-F238E27FC236}">
+                <a16:creationId xmlns:a16="http://schemas.microsoft.com/office/drawing/2014/main" id="{19C714FA-D02F-D74A-9674-16A5D19A4F36}"/>
+              </a:ext>
+            </a:extLst>
+          </p:cNvPr>
+          <p:cNvSpPr/>
+          <p:nvPr/>
+        </p:nvSpPr>
+        <p:spPr>
+          <a:xfrm rot="19175766">
+            <a:off x="2749316" y="1365724"/>
+            <a:ext cx="6209756" cy="6703068"/>
+          </a:xfrm>
+          <a:prstGeom prst="arc">
+            <a:avLst>
+              <a:gd name="adj1" fmla="val 16240799"/>
+              <a:gd name="adj2" fmla="val 20758865"/>
+            </a:avLst>
+          </a:prstGeom>
+          <a:ln w="34925">
+            <a:headEnd type="oval"/>
+            <a:tailEnd type="triangle" w="lg" len="lg"/>
+          </a:ln>
+          <a:effectLst/>
+        </p:spPr>
+        <p:style>
+          <a:lnRef idx="2">
+            <a:schemeClr val="accent1"/>
+          </a:lnRef>
+          <a:fillRef idx="0">
+            <a:schemeClr val="accent1"/>
+          </a:fillRef>
+          <a:effectRef idx="1">
+            <a:schemeClr val="accent1"/>
+          </a:effectRef>
+          <a:fontRef idx="minor">
+            <a:schemeClr val="tx1"/>
+          </a:fontRef>
+        </p:style>
+        <p:txBody>
+          <a:bodyPr rtlCol="0" anchor="ctr"/>
+          <a:lstStyle/>
+          <a:p>
+            <a:pPr algn="ctr"/>
+            <a:endParaRPr lang="en-US"/>
+          </a:p>
+        </p:txBody>
+      </p:sp>
+      <p:sp>
+        <p:nvSpPr>
+          <p:cNvPr id="55" name="Arc 54">
+            <a:extLst>
+              <a:ext uri="{FF2B5EF4-FFF2-40B4-BE49-F238E27FC236}">
+                <a16:creationId xmlns:a16="http://schemas.microsoft.com/office/drawing/2014/main" id="{B64AB721-40BF-6B44-B50C-389533C491EC}"/>
+              </a:ext>
+            </a:extLst>
+          </p:cNvPr>
+          <p:cNvSpPr/>
+          <p:nvPr/>
+        </p:nvSpPr>
+        <p:spPr>
+          <a:xfrm rot="19175766">
+            <a:off x="508616" y="1365723"/>
+            <a:ext cx="6209756" cy="6703068"/>
+          </a:xfrm>
+          <a:prstGeom prst="arc">
+            <a:avLst>
+              <a:gd name="adj1" fmla="val 16240799"/>
+              <a:gd name="adj2" fmla="val 20758865"/>
+            </a:avLst>
+          </a:prstGeom>
+          <a:ln w="34925">
+            <a:headEnd type="oval"/>
+            <a:tailEnd type="triangle" w="lg" len="lg"/>
+          </a:ln>
+          <a:effectLst/>
+        </p:spPr>
+        <p:style>
+          <a:lnRef idx="2">
+            <a:schemeClr val="accent1"/>
+          </a:lnRef>
+          <a:fillRef idx="0">
+            <a:schemeClr val="accent1"/>
+          </a:fillRef>
+          <a:effectRef idx="1">
+            <a:schemeClr val="accent1"/>
+          </a:effectRef>
+          <a:fontRef idx="minor">
+            <a:schemeClr val="tx1"/>
+          </a:fontRef>
+        </p:style>
+        <p:txBody>
+          <a:bodyPr rtlCol="0" anchor="ctr"/>
+          <a:lstStyle/>
+          <a:p>
+            <a:pPr algn="ctr"/>
+            <a:endParaRPr lang="en-US"/>
+          </a:p>
+        </p:txBody>
+      </p:sp>
+      <p:cxnSp>
+        <p:nvCxnSpPr>
+          <p:cNvPr id="66" name="Straight Arrow Connector 65">
+            <a:extLst>
+              <a:ext uri="{FF2B5EF4-FFF2-40B4-BE49-F238E27FC236}">
+                <a16:creationId xmlns:a16="http://schemas.microsoft.com/office/drawing/2014/main" id="{8C6CAABB-78AE-A247-81DC-DF038B460260}"/>
+              </a:ext>
+            </a:extLst>
+          </p:cNvPr>
+          <p:cNvCxnSpPr>
+            <a:cxnSpLocks/>
+          </p:cNvCxnSpPr>
+          <p:nvPr/>
+        </p:nvCxnSpPr>
+        <p:spPr>
+          <a:xfrm>
+            <a:off x="4322618" y="2688576"/>
+            <a:ext cx="665031" cy="0"/>
+          </a:xfrm>
+          <a:prstGeom prst="straightConnector1">
+            <a:avLst/>
+          </a:prstGeom>
+          <a:ln w="34925">
+            <a:headEnd type="oval" w="med" len="med"/>
+            <a:tailEnd type="triangle" w="lg" len="lg"/>
+          </a:ln>
+          <a:effectLst/>
+        </p:spPr>
+        <p:style>
+          <a:lnRef idx="2">
+            <a:schemeClr val="accent1"/>
+          </a:lnRef>
+          <a:fillRef idx="0">
+            <a:schemeClr val="accent1"/>
+          </a:fillRef>
+          <a:effectRef idx="1">
+            <a:schemeClr val="accent1"/>
+          </a:effectRef>
+          <a:fontRef idx="minor">
+            <a:schemeClr val="tx1"/>
+          </a:fontRef>
+        </p:style>
+      </p:cxnSp>
+      <p:cxnSp>
+        <p:nvCxnSpPr>
+          <p:cNvPr id="73" name="Straight Arrow Connector 72">
+            <a:extLst>
+              <a:ext uri="{FF2B5EF4-FFF2-40B4-BE49-F238E27FC236}">
+                <a16:creationId xmlns:a16="http://schemas.microsoft.com/office/drawing/2014/main" id="{67840758-67AC-7342-980D-0D35B1C00DA6}"/>
+              </a:ext>
+            </a:extLst>
+          </p:cNvPr>
+          <p:cNvCxnSpPr>
+            <a:cxnSpLocks/>
+          </p:cNvCxnSpPr>
+          <p:nvPr/>
+        </p:nvCxnSpPr>
+        <p:spPr>
+          <a:xfrm>
+            <a:off x="6303968" y="2729329"/>
+            <a:ext cx="759952" cy="0"/>
+          </a:xfrm>
+          <a:prstGeom prst="straightConnector1">
+            <a:avLst/>
+          </a:prstGeom>
+          <a:ln w="34925">
             <a:headEnd type="oval" w="med" len="med"/>
             <a:tailEnd type="triangle" w="lg" len="lg"/>
           </a:ln>

</xml_diff>

<commit_message>
renaming data files, updating citations in heroin document, uploading Maryville College talk from Sep 18, 2018
</commit_message>
<xml_diff>
--- a/heroin_model_formulation/heroin_schematic.pptx
+++ b/heroin_model_formulation/heroin_schematic.pptx
@@ -301,7 +301,7 @@
           <a:lstStyle/>
           <a:p>
             <a:fld id="{5A3E0873-EA00-D142-ACA6-784333225662}" type="datetimeFigureOut">
-              <a:t>9/1/18</a:t>
+              <a:t>9/14/18</a:t>
             </a:fld>
             <a:endParaRPr lang="en-US"/>
           </a:p>
@@ -467,7 +467,7 @@
           <a:lstStyle/>
           <a:p>
             <a:fld id="{5A3E0873-EA00-D142-ACA6-784333225662}" type="datetimeFigureOut">
-              <a:t>9/1/18</a:t>
+              <a:t>9/14/18</a:t>
             </a:fld>
             <a:endParaRPr lang="en-US"/>
           </a:p>
@@ -643,7 +643,7 @@
           <a:lstStyle/>
           <a:p>
             <a:fld id="{5A3E0873-EA00-D142-ACA6-784333225662}" type="datetimeFigureOut">
-              <a:t>9/1/18</a:t>
+              <a:t>9/14/18</a:t>
             </a:fld>
             <a:endParaRPr lang="en-US"/>
           </a:p>
@@ -809,7 +809,7 @@
           <a:lstStyle/>
           <a:p>
             <a:fld id="{5A3E0873-EA00-D142-ACA6-784333225662}" type="datetimeFigureOut">
-              <a:t>9/1/18</a:t>
+              <a:t>9/14/18</a:t>
             </a:fld>
             <a:endParaRPr lang="en-US"/>
           </a:p>
@@ -1052,7 +1052,7 @@
           <a:lstStyle/>
           <a:p>
             <a:fld id="{5A3E0873-EA00-D142-ACA6-784333225662}" type="datetimeFigureOut">
-              <a:t>9/1/18</a:t>
+              <a:t>9/14/18</a:t>
             </a:fld>
             <a:endParaRPr lang="en-US"/>
           </a:p>
@@ -1335,7 +1335,7 @@
           <a:lstStyle/>
           <a:p>
             <a:fld id="{5A3E0873-EA00-D142-ACA6-784333225662}" type="datetimeFigureOut">
-              <a:t>9/1/18</a:t>
+              <a:t>9/14/18</a:t>
             </a:fld>
             <a:endParaRPr lang="en-US"/>
           </a:p>
@@ -1752,7 +1752,7 @@
           <a:lstStyle/>
           <a:p>
             <a:fld id="{5A3E0873-EA00-D142-ACA6-784333225662}" type="datetimeFigureOut">
-              <a:t>9/1/18</a:t>
+              <a:t>9/14/18</a:t>
             </a:fld>
             <a:endParaRPr lang="en-US"/>
           </a:p>
@@ -1867,7 +1867,7 @@
           <a:lstStyle/>
           <a:p>
             <a:fld id="{5A3E0873-EA00-D142-ACA6-784333225662}" type="datetimeFigureOut">
-              <a:t>9/1/18</a:t>
+              <a:t>9/14/18</a:t>
             </a:fld>
             <a:endParaRPr lang="en-US"/>
           </a:p>
@@ -1960,7 +1960,7 @@
           <a:lstStyle/>
           <a:p>
             <a:fld id="{5A3E0873-EA00-D142-ACA6-784333225662}" type="datetimeFigureOut">
-              <a:t>9/1/18</a:t>
+              <a:t>9/14/18</a:t>
             </a:fld>
             <a:endParaRPr lang="en-US"/>
           </a:p>
@@ -2233,7 +2233,7 @@
           <a:lstStyle/>
           <a:p>
             <a:fld id="{5A3E0873-EA00-D142-ACA6-784333225662}" type="datetimeFigureOut">
-              <a:t>9/1/18</a:t>
+              <a:t>9/14/18</a:t>
             </a:fld>
             <a:endParaRPr lang="en-US"/>
           </a:p>
@@ -2483,7 +2483,7 @@
           <a:lstStyle/>
           <a:p>
             <a:fld id="{5A3E0873-EA00-D142-ACA6-784333225662}" type="datetimeFigureOut">
-              <a:t>9/1/18</a:t>
+              <a:t>9/14/18</a:t>
             </a:fld>
             <a:endParaRPr lang="en-US"/>
           </a:p>
@@ -2692,7 +2692,7 @@
           </a:lstStyle>
           <a:p>
             <a:fld id="{5A3E0873-EA00-D142-ACA6-784333225662}" type="datetimeFigureOut">
-              <a:t>9/1/18</a:t>
+              <a:t>9/14/18</a:t>
             </a:fld>
             <a:endParaRPr lang="en-US"/>
           </a:p>
@@ -3149,7 +3149,7 @@
             <a:prstGeom prst="rect">
               <a:avLst/>
             </a:prstGeom>
-            <a:grpFill/>
+            <a:noFill/>
           </p:spPr>
           <p:txBody>
             <a:bodyPr wrap="square" rtlCol="0">
@@ -4855,7 +4855,7 @@
         </p:nvCxnSpPr>
         <p:spPr>
           <a:xfrm flipH="1" flipV="1">
-            <a:off x="5693543" y="3200676"/>
+            <a:off x="5892433" y="3139783"/>
             <a:ext cx="545515" cy="624312"/>
           </a:xfrm>
           <a:prstGeom prst="straightConnector1">
@@ -4898,7 +4898,7 @@
         </p:nvCxnSpPr>
         <p:spPr>
           <a:xfrm>
-            <a:off x="6000795" y="3190917"/>
+            <a:off x="5711915" y="3308092"/>
             <a:ext cx="503728" cy="619261"/>
           </a:xfrm>
           <a:prstGeom prst="straightConnector1">

</xml_diff>

<commit_message>
changing notation in schematic diagram of model from \beta and \xi to \beta_A and \beta_P (\beta\xi=\beta_P and \beta(1-\xi)=beta_A)
</commit_message>
<xml_diff>
--- a/heroin_model_formulation/heroin_schematic.pptx
+++ b/heroin_model_formulation/heroin_schematic.pptx
@@ -301,7 +301,7 @@
           <a:lstStyle/>
           <a:p>
             <a:fld id="{5A3E0873-EA00-D142-ACA6-784333225662}" type="datetimeFigureOut">
-              <a:t>9/14/18</a:t>
+              <a:t>11/13/18</a:t>
             </a:fld>
             <a:endParaRPr lang="en-US"/>
           </a:p>
@@ -467,7 +467,7 @@
           <a:lstStyle/>
           <a:p>
             <a:fld id="{5A3E0873-EA00-D142-ACA6-784333225662}" type="datetimeFigureOut">
-              <a:t>9/14/18</a:t>
+              <a:t>11/13/18</a:t>
             </a:fld>
             <a:endParaRPr lang="en-US"/>
           </a:p>
@@ -643,7 +643,7 @@
           <a:lstStyle/>
           <a:p>
             <a:fld id="{5A3E0873-EA00-D142-ACA6-784333225662}" type="datetimeFigureOut">
-              <a:t>9/14/18</a:t>
+              <a:t>11/13/18</a:t>
             </a:fld>
             <a:endParaRPr lang="en-US"/>
           </a:p>
@@ -809,7 +809,7 @@
           <a:lstStyle/>
           <a:p>
             <a:fld id="{5A3E0873-EA00-D142-ACA6-784333225662}" type="datetimeFigureOut">
-              <a:t>9/14/18</a:t>
+              <a:t>11/13/18</a:t>
             </a:fld>
             <a:endParaRPr lang="en-US"/>
           </a:p>
@@ -1052,7 +1052,7 @@
           <a:lstStyle/>
           <a:p>
             <a:fld id="{5A3E0873-EA00-D142-ACA6-784333225662}" type="datetimeFigureOut">
-              <a:t>9/14/18</a:t>
+              <a:t>11/13/18</a:t>
             </a:fld>
             <a:endParaRPr lang="en-US"/>
           </a:p>
@@ -1335,7 +1335,7 @@
           <a:lstStyle/>
           <a:p>
             <a:fld id="{5A3E0873-EA00-D142-ACA6-784333225662}" type="datetimeFigureOut">
-              <a:t>9/14/18</a:t>
+              <a:t>11/13/18</a:t>
             </a:fld>
             <a:endParaRPr lang="en-US"/>
           </a:p>
@@ -1752,7 +1752,7 @@
           <a:lstStyle/>
           <a:p>
             <a:fld id="{5A3E0873-EA00-D142-ACA6-784333225662}" type="datetimeFigureOut">
-              <a:t>9/14/18</a:t>
+              <a:t>11/13/18</a:t>
             </a:fld>
             <a:endParaRPr lang="en-US"/>
           </a:p>
@@ -1867,7 +1867,7 @@
           <a:lstStyle/>
           <a:p>
             <a:fld id="{5A3E0873-EA00-D142-ACA6-784333225662}" type="datetimeFigureOut">
-              <a:t>9/14/18</a:t>
+              <a:t>11/13/18</a:t>
             </a:fld>
             <a:endParaRPr lang="en-US"/>
           </a:p>
@@ -1960,7 +1960,7 @@
           <a:lstStyle/>
           <a:p>
             <a:fld id="{5A3E0873-EA00-D142-ACA6-784333225662}" type="datetimeFigureOut">
-              <a:t>9/14/18</a:t>
+              <a:t>11/13/18</a:t>
             </a:fld>
             <a:endParaRPr lang="en-US"/>
           </a:p>
@@ -2233,7 +2233,7 @@
           <a:lstStyle/>
           <a:p>
             <a:fld id="{5A3E0873-EA00-D142-ACA6-784333225662}" type="datetimeFigureOut">
-              <a:t>9/14/18</a:t>
+              <a:t>11/13/18</a:t>
             </a:fld>
             <a:endParaRPr lang="en-US"/>
           </a:p>
@@ -2483,7 +2483,7 @@
           <a:lstStyle/>
           <a:p>
             <a:fld id="{5A3E0873-EA00-D142-ACA6-784333225662}" type="datetimeFigureOut">
-              <a:t>9/14/18</a:t>
+              <a:t>11/13/18</a:t>
             </a:fld>
             <a:endParaRPr lang="en-US"/>
           </a:p>
@@ -2692,7 +2692,7 @@
           </a:lstStyle>
           <a:p>
             <a:fld id="{5A3E0873-EA00-D142-ACA6-784333225662}" type="datetimeFigureOut">
-              <a:t>9/14/18</a:t>
+              <a:t>11/13/18</a:t>
             </a:fld>
             <a:endParaRPr lang="en-US"/>
           </a:p>
@@ -3692,7 +3692,7 @@
         </p:nvSpPr>
         <p:spPr>
           <a:xfrm>
-            <a:off x="2845344" y="1147328"/>
+            <a:off x="2875824" y="1147328"/>
             <a:ext cx="1076241" cy="307777"/>
           </a:xfrm>
           <a:prstGeom prst="rect">
@@ -3713,7 +3713,22 @@
                 <a:ea typeface="Times New Roman" charset="0"/>
                 <a:cs typeface="Times New Roman" charset="0"/>
               </a:rPr>
-              <a:t>β(1-ξ)SA</a:t>
+              <a:t>β</a:t>
+            </a:r>
+            <a:r>
+              <a:rPr lang="en-US" sz="1400" baseline="-25000" dirty="0">
+                <a:latin typeface="Times New Roman"/>
+                <a:cs typeface="Times New Roman"/>
+              </a:rPr>
+              <a:t>A </a:t>
+            </a:r>
+            <a:r>
+              <a:rPr lang="en-US" sz="1400" dirty="0">
+                <a:latin typeface="Times New Roman" charset="0"/>
+                <a:ea typeface="Times New Roman" charset="0"/>
+                <a:cs typeface="Times New Roman" charset="0"/>
+              </a:rPr>
+              <a:t>SA</a:t>
             </a:r>
           </a:p>
         </p:txBody>
@@ -4089,7 +4104,7 @@
         </p:nvSpPr>
         <p:spPr>
           <a:xfrm>
-            <a:off x="2987939" y="1466151"/>
+            <a:off x="3033659" y="1466151"/>
             <a:ext cx="721080" cy="307777"/>
           </a:xfrm>
           <a:prstGeom prst="rect">
@@ -4113,18 +4128,20 @@
               <a:t>β</a:t>
             </a:r>
             <a:r>
-              <a:rPr lang="en-US" sz="1400" dirty="0" err="1">
+              <a:rPr lang="en-US" sz="1400" baseline="-25000" dirty="0">
+                <a:latin typeface="Times New Roman"/>
+                <a:cs typeface="Times New Roman"/>
+              </a:rPr>
+              <a:t>P</a:t>
+            </a:r>
+            <a:r>
+              <a:rPr lang="en-US" sz="1400" dirty="0">
                 <a:latin typeface="Times New Roman" charset="0"/>
                 <a:ea typeface="Times New Roman" charset="0"/>
                 <a:cs typeface="Times New Roman" charset="0"/>
               </a:rPr>
-              <a:t>ξSP</a:t>
-            </a:r>
-            <a:endParaRPr lang="en-US" sz="1400" dirty="0">
-              <a:latin typeface="Times New Roman" charset="0"/>
-              <a:ea typeface="Times New Roman" charset="0"/>
-              <a:cs typeface="Times New Roman" charset="0"/>
-            </a:endParaRPr>
+              <a:t>SP</a:t>
+            </a:r>
           </a:p>
         </p:txBody>
       </p:sp>

</xml_diff>

<commit_message>
updating model with sigma (A/A+H) and sigma(H/(A+H) terms and making changes of description of terms and schematic diagram and proof of non-negative solutions
</commit_message>
<xml_diff>
--- a/heroin_model_formulation/heroin_schematic.pptx
+++ b/heroin_model_formulation/heroin_schematic.pptx
@@ -301,7 +301,7 @@
           <a:lstStyle/>
           <a:p>
             <a:fld id="{5A3E0873-EA00-D142-ACA6-784333225662}" type="datetimeFigureOut">
-              <a:t>11/13/18</a:t>
+              <a:t>1/9/19</a:t>
             </a:fld>
             <a:endParaRPr lang="en-US"/>
           </a:p>
@@ -467,7 +467,7 @@
           <a:lstStyle/>
           <a:p>
             <a:fld id="{5A3E0873-EA00-D142-ACA6-784333225662}" type="datetimeFigureOut">
-              <a:t>11/13/18</a:t>
+              <a:t>1/9/19</a:t>
             </a:fld>
             <a:endParaRPr lang="en-US"/>
           </a:p>
@@ -643,7 +643,7 @@
           <a:lstStyle/>
           <a:p>
             <a:fld id="{5A3E0873-EA00-D142-ACA6-784333225662}" type="datetimeFigureOut">
-              <a:t>11/13/18</a:t>
+              <a:t>1/9/19</a:t>
             </a:fld>
             <a:endParaRPr lang="en-US"/>
           </a:p>
@@ -809,7 +809,7 @@
           <a:lstStyle/>
           <a:p>
             <a:fld id="{5A3E0873-EA00-D142-ACA6-784333225662}" type="datetimeFigureOut">
-              <a:t>11/13/18</a:t>
+              <a:t>1/9/19</a:t>
             </a:fld>
             <a:endParaRPr lang="en-US"/>
           </a:p>
@@ -1052,7 +1052,7 @@
           <a:lstStyle/>
           <a:p>
             <a:fld id="{5A3E0873-EA00-D142-ACA6-784333225662}" type="datetimeFigureOut">
-              <a:t>11/13/18</a:t>
+              <a:t>1/9/19</a:t>
             </a:fld>
             <a:endParaRPr lang="en-US"/>
           </a:p>
@@ -1335,7 +1335,7 @@
           <a:lstStyle/>
           <a:p>
             <a:fld id="{5A3E0873-EA00-D142-ACA6-784333225662}" type="datetimeFigureOut">
-              <a:t>11/13/18</a:t>
+              <a:t>1/9/19</a:t>
             </a:fld>
             <a:endParaRPr lang="en-US"/>
           </a:p>
@@ -1752,7 +1752,7 @@
           <a:lstStyle/>
           <a:p>
             <a:fld id="{5A3E0873-EA00-D142-ACA6-784333225662}" type="datetimeFigureOut">
-              <a:t>11/13/18</a:t>
+              <a:t>1/9/19</a:t>
             </a:fld>
             <a:endParaRPr lang="en-US"/>
           </a:p>
@@ -1867,7 +1867,7 @@
           <a:lstStyle/>
           <a:p>
             <a:fld id="{5A3E0873-EA00-D142-ACA6-784333225662}" type="datetimeFigureOut">
-              <a:t>11/13/18</a:t>
+              <a:t>1/9/19</a:t>
             </a:fld>
             <a:endParaRPr lang="en-US"/>
           </a:p>
@@ -1960,7 +1960,7 @@
           <a:lstStyle/>
           <a:p>
             <a:fld id="{5A3E0873-EA00-D142-ACA6-784333225662}" type="datetimeFigureOut">
-              <a:t>11/13/18</a:t>
+              <a:t>1/9/19</a:t>
             </a:fld>
             <a:endParaRPr lang="en-US"/>
           </a:p>
@@ -2233,7 +2233,7 @@
           <a:lstStyle/>
           <a:p>
             <a:fld id="{5A3E0873-EA00-D142-ACA6-784333225662}" type="datetimeFigureOut">
-              <a:t>11/13/18</a:t>
+              <a:t>1/9/19</a:t>
             </a:fld>
             <a:endParaRPr lang="en-US"/>
           </a:p>
@@ -2483,7 +2483,7 @@
           <a:lstStyle/>
           <a:p>
             <a:fld id="{5A3E0873-EA00-D142-ACA6-784333225662}" type="datetimeFigureOut">
-              <a:t>11/13/18</a:t>
+              <a:t>1/9/19</a:t>
             </a:fld>
             <a:endParaRPr lang="en-US"/>
           </a:p>
@@ -2692,7 +2692,7 @@
           </a:lstStyle>
           <a:p>
             <a:fld id="{5A3E0873-EA00-D142-ACA6-784333225662}" type="datetimeFigureOut">
-              <a:t>11/13/18</a:t>
+              <a:t>1/9/19</a:t>
             </a:fld>
             <a:endParaRPr lang="en-US"/>
           </a:p>
@@ -3903,69 +3903,163 @@
           </a:p>
         </p:txBody>
       </p:sp>
-      <p:sp>
-        <p:nvSpPr>
-          <p:cNvPr id="65" name="TextBox 64"/>
-          <p:cNvSpPr txBox="1"/>
-          <p:nvPr/>
-        </p:nvSpPr>
-        <p:spPr>
-          <a:xfrm>
-            <a:off x="5839252" y="3201332"/>
-            <a:ext cx="1160612" cy="307777"/>
-          </a:xfrm>
-          <a:prstGeom prst="rect">
-            <a:avLst/>
-          </a:prstGeom>
-          <a:noFill/>
-        </p:spPr>
-        <p:txBody>
-          <a:bodyPr wrap="square" rtlCol="0">
-            <a:spAutoFit/>
-          </a:bodyPr>
-          <a:lstStyle/>
-          <a:p>
-            <a:pPr algn="ctr"/>
-            <a:r>
-              <a:rPr lang="en-US" sz="1400" dirty="0">
-                <a:latin typeface="Times New Roman" charset="0"/>
-                <a:ea typeface="Times New Roman" charset="0"/>
-                <a:cs typeface="Times New Roman" charset="0"/>
-              </a:rPr>
-              <a:t> </a:t>
-            </a:r>
-            <a:r>
-              <a:rPr lang="en-US" sz="1400" dirty="0" err="1">
-                <a:latin typeface="Times New Roman" charset="0"/>
-                <a:ea typeface="Times New Roman" charset="0"/>
-                <a:cs typeface="Times New Roman" charset="0"/>
-              </a:rPr>
-              <a:t>σ</a:t>
-            </a:r>
-            <a:r>
-              <a:rPr lang="en-US" sz="1400" baseline="-25000" dirty="0" err="1">
-                <a:latin typeface="Times New Roman" charset="0"/>
-                <a:ea typeface="Times New Roman" charset="0"/>
-                <a:cs typeface="Times New Roman" charset="0"/>
-              </a:rPr>
-              <a:t>A</a:t>
-            </a:r>
-            <a:r>
-              <a:rPr lang="en-US" sz="1400" dirty="0" err="1">
-                <a:latin typeface="Times New Roman" charset="0"/>
-                <a:ea typeface="Times New Roman" charset="0"/>
-                <a:cs typeface="Times New Roman" charset="0"/>
-              </a:rPr>
-              <a:t>R</a:t>
-            </a:r>
-            <a:endParaRPr lang="en-US" sz="1400" dirty="0">
-              <a:latin typeface="Times New Roman" charset="0"/>
-              <a:ea typeface="Times New Roman" charset="0"/>
-              <a:cs typeface="Times New Roman" charset="0"/>
-            </a:endParaRPr>
-          </a:p>
-        </p:txBody>
-      </p:sp>
+      <mc:AlternateContent xmlns:mc="http://schemas.openxmlformats.org/markup-compatibility/2006">
+        <mc:Choice xmlns:a14="http://schemas.microsoft.com/office/drawing/2010/main" Requires="a14">
+          <p:sp>
+            <p:nvSpPr>
+              <p:cNvPr id="65" name="TextBox 64"/>
+              <p:cNvSpPr txBox="1"/>
+              <p:nvPr/>
+            </p:nvSpPr>
+            <p:spPr>
+              <a:xfrm>
+                <a:off x="5948109" y="3200469"/>
+                <a:ext cx="1160612" cy="613630"/>
+              </a:xfrm>
+              <a:prstGeom prst="rect">
+                <a:avLst/>
+              </a:prstGeom>
+              <a:noFill/>
+            </p:spPr>
+            <p:txBody>
+              <a:bodyPr wrap="square" rtlCol="0">
+                <a:spAutoFit/>
+              </a:bodyPr>
+              <a:lstStyle/>
+              <a:p>
+                <a:pPr algn="ctr"/>
+                <a:r>
+                  <a:rPr lang="en-US" sz="1400" dirty="0">
+                    <a:latin typeface="Times New Roman" charset="0"/>
+                    <a:ea typeface="Times New Roman" charset="0"/>
+                    <a:cs typeface="Times New Roman" charset="0"/>
+                  </a:rPr>
+                  <a:t> </a:t>
+                </a:r>
+                <a:r>
+                  <a:rPr lang="en-US" sz="1400" dirty="0" err="1">
+                    <a:latin typeface="Times New Roman" charset="0"/>
+                    <a:ea typeface="Times New Roman" charset="0"/>
+                    <a:cs typeface="Times New Roman" charset="0"/>
+                  </a:rPr>
+                  <a:t>σR</a:t>
+                </a:r>
+                <a14:m>
+                  <m:oMath xmlns:m="http://schemas.openxmlformats.org/officeDocument/2006/math">
+                    <m:f>
+                      <m:fPr>
+                        <m:ctrlPr>
+                          <a:rPr lang="en-US" sz="1400" b="0" smtClean="0">
+                            <a:latin typeface="Cambria Math" panose="02040503050406030204" pitchFamily="18" charset="0"/>
+                            <a:ea typeface="Times New Roman" charset="0"/>
+                            <a:cs typeface="Times New Roman" charset="0"/>
+                          </a:rPr>
+                        </m:ctrlPr>
+                      </m:fPr>
+                      <m:num>
+                        <m:r>
+                          <m:rPr>
+                            <m:sty m:val="p"/>
+                          </m:rPr>
+                          <a:rPr lang="en-US" sz="1400" b="0" i="0" smtClean="0">
+                            <a:latin typeface="Cambria Math" panose="02040503050406030204" pitchFamily="18" charset="0"/>
+                            <a:ea typeface="Times New Roman" charset="0"/>
+                            <a:cs typeface="Times New Roman" charset="0"/>
+                          </a:rPr>
+                          <m:t>A</m:t>
+                        </m:r>
+                      </m:num>
+                      <m:den>
+                        <m:r>
+                          <m:rPr>
+                            <m:sty m:val="p"/>
+                          </m:rPr>
+                          <a:rPr lang="en-US" sz="1400" b="0" i="0" smtClean="0">
+                            <a:latin typeface="Cambria Math" panose="02040503050406030204" pitchFamily="18" charset="0"/>
+                            <a:ea typeface="Times New Roman" charset="0"/>
+                            <a:cs typeface="Times New Roman" charset="0"/>
+                          </a:rPr>
+                          <m:t>A</m:t>
+                        </m:r>
+                        <m:r>
+                          <a:rPr lang="en-US" sz="1400" b="0" i="0" smtClean="0">
+                            <a:latin typeface="Cambria Math" panose="02040503050406030204" pitchFamily="18" charset="0"/>
+                            <a:ea typeface="Times New Roman" charset="0"/>
+                            <a:cs typeface="Times New Roman" charset="0"/>
+                          </a:rPr>
+                          <m:t>+</m:t>
+                        </m:r>
+                        <m:r>
+                          <m:rPr>
+                            <m:sty m:val="p"/>
+                          </m:rPr>
+                          <a:rPr lang="en-US" sz="1400" b="0" i="0" smtClean="0">
+                            <a:latin typeface="Cambria Math" panose="02040503050406030204" pitchFamily="18" charset="0"/>
+                            <a:ea typeface="Times New Roman" charset="0"/>
+                            <a:cs typeface="Times New Roman" charset="0"/>
+                          </a:rPr>
+                          <m:t>H</m:t>
+                        </m:r>
+                      </m:den>
+                    </m:f>
+                  </m:oMath>
+                </a14:m>
+                <a:endParaRPr lang="en-US" sz="1400" b="0" dirty="0">
+                  <a:latin typeface="Times New Roman" charset="0"/>
+                  <a:ea typeface="Times New Roman" charset="0"/>
+                  <a:cs typeface="Times New Roman" charset="0"/>
+                </a:endParaRPr>
+              </a:p>
+              <a:p>
+                <a:pPr algn="ctr"/>
+                <a:endParaRPr lang="en-US" sz="1400" dirty="0">
+                  <a:latin typeface="Times New Roman" charset="0"/>
+                  <a:ea typeface="Times New Roman" charset="0"/>
+                  <a:cs typeface="Times New Roman" charset="0"/>
+                </a:endParaRPr>
+              </a:p>
+            </p:txBody>
+          </p:sp>
+        </mc:Choice>
+        <mc:Fallback>
+          <p:sp>
+            <p:nvSpPr>
+              <p:cNvPr id="65" name="TextBox 64"/>
+              <p:cNvSpPr txBox="1">
+                <a:spLocks noRot="1" noChangeAspect="1" noMove="1" noResize="1" noEditPoints="1" noAdjustHandles="1" noChangeArrowheads="1" noChangeShapeType="1" noTextEdit="1"/>
+              </p:cNvSpPr>
+              <p:nvPr/>
+            </p:nvSpPr>
+            <p:spPr>
+              <a:xfrm>
+                <a:off x="5948109" y="3200469"/>
+                <a:ext cx="1160612" cy="613630"/>
+              </a:xfrm>
+              <a:prstGeom prst="rect">
+                <a:avLst/>
+              </a:prstGeom>
+              <a:blipFill>
+                <a:blip r:embed="rId2"/>
+                <a:stretch>
+                  <a:fillRect/>
+                </a:stretch>
+              </a:blipFill>
+            </p:spPr>
+            <p:txBody>
+              <a:bodyPr/>
+              <a:lstStyle/>
+              <a:p>
+                <a:r>
+                  <a:rPr lang="en-US">
+                    <a:noFill/>
+                  </a:rPr>
+                  <a:t> </a:t>
+                </a:r>
+              </a:p>
+            </p:txBody>
+          </p:sp>
+        </mc:Fallback>
+      </mc:AlternateContent>
       <p:sp>
         <p:nvSpPr>
           <p:cNvPr id="67" name="TextBox 66"/>
@@ -4676,68 +4770,6 @@
           </a:fontRef>
         </p:style>
       </p:cxnSp>
-      <p:sp>
-        <p:nvSpPr>
-          <p:cNvPr id="75" name="Rectangle 74"/>
-          <p:cNvSpPr/>
-          <p:nvPr/>
-        </p:nvSpPr>
-        <p:spPr>
-          <a:xfrm>
-            <a:off x="7539379" y="3429441"/>
-            <a:ext cx="532518" cy="307777"/>
-          </a:xfrm>
-          <a:prstGeom prst="rect">
-            <a:avLst/>
-          </a:prstGeom>
-        </p:spPr>
-        <p:txBody>
-          <a:bodyPr wrap="none">
-            <a:spAutoFit/>
-          </a:bodyPr>
-          <a:lstStyle/>
-          <a:p>
-            <a:pPr algn="ctr"/>
-            <a:r>
-              <a:rPr lang="en-US" sz="1400" dirty="0">
-                <a:latin typeface="Times New Roman" charset="0"/>
-                <a:ea typeface="Times New Roman" charset="0"/>
-                <a:cs typeface="Times New Roman" charset="0"/>
-              </a:rPr>
-              <a:t> </a:t>
-            </a:r>
-            <a:r>
-              <a:rPr lang="en-US" sz="1400" dirty="0" err="1">
-                <a:latin typeface="Times New Roman" charset="0"/>
-                <a:ea typeface="Times New Roman" charset="0"/>
-                <a:cs typeface="Times New Roman" charset="0"/>
-              </a:rPr>
-              <a:t>σ</a:t>
-            </a:r>
-            <a:r>
-              <a:rPr lang="en-US" sz="1400" baseline="-25000" dirty="0" err="1">
-                <a:latin typeface="Times New Roman" charset="0"/>
-                <a:ea typeface="Times New Roman" charset="0"/>
-                <a:cs typeface="Times New Roman" charset="0"/>
-              </a:rPr>
-              <a:t>H</a:t>
-            </a:r>
-            <a:r>
-              <a:rPr lang="en-US" sz="1400" dirty="0" err="1">
-                <a:latin typeface="Times New Roman" charset="0"/>
-                <a:ea typeface="Times New Roman" charset="0"/>
-                <a:cs typeface="Times New Roman" charset="0"/>
-              </a:rPr>
-              <a:t>R</a:t>
-            </a:r>
-            <a:endParaRPr lang="en-US" sz="1400" dirty="0">
-              <a:latin typeface="Times New Roman" charset="0"/>
-              <a:ea typeface="Times New Roman" charset="0"/>
-              <a:cs typeface="Times New Roman" charset="0"/>
-            </a:endParaRPr>
-          </a:p>
-        </p:txBody>
-      </p:sp>
       <p:cxnSp>
         <p:nvCxnSpPr>
           <p:cNvPr id="77" name="Straight Arrow Connector 76"/>
@@ -5132,6 +5164,175 @@
           </a:fontRef>
         </p:style>
       </p:cxnSp>
+      <mc:AlternateContent xmlns:mc="http://schemas.openxmlformats.org/markup-compatibility/2006">
+        <mc:Choice xmlns:a14="http://schemas.microsoft.com/office/drawing/2010/main" Requires="a14">
+          <p:sp>
+            <p:nvSpPr>
+              <p:cNvPr id="53" name="TextBox 52">
+                <a:extLst>
+                  <a:ext uri="{FF2B5EF4-FFF2-40B4-BE49-F238E27FC236}">
+                    <a16:creationId xmlns:a16="http://schemas.microsoft.com/office/drawing/2014/main" id="{F94E7BCE-A4B0-F643-BAE8-8B0328802A75}"/>
+                  </a:ext>
+                </a:extLst>
+              </p:cNvPr>
+              <p:cNvSpPr txBox="1"/>
+              <p:nvPr/>
+            </p:nvSpPr>
+            <p:spPr>
+              <a:xfrm>
+                <a:off x="7289015" y="3397412"/>
+                <a:ext cx="1160612" cy="632609"/>
+              </a:xfrm>
+              <a:prstGeom prst="rect">
+                <a:avLst/>
+              </a:prstGeom>
+              <a:noFill/>
+            </p:spPr>
+            <p:txBody>
+              <a:bodyPr wrap="square" rtlCol="0">
+                <a:spAutoFit/>
+              </a:bodyPr>
+              <a:lstStyle/>
+              <a:p>
+                <a:pPr algn="ctr"/>
+                <a:r>
+                  <a:rPr lang="en-US" sz="1400" dirty="0">
+                    <a:latin typeface="Times New Roman" charset="0"/>
+                    <a:ea typeface="Times New Roman" charset="0"/>
+                    <a:cs typeface="Times New Roman" charset="0"/>
+                  </a:rPr>
+                  <a:t> </a:t>
+                </a:r>
+                <a:r>
+                  <a:rPr lang="en-US" sz="1400" dirty="0" err="1">
+                    <a:latin typeface="Times New Roman" charset="0"/>
+                    <a:ea typeface="Times New Roman" charset="0"/>
+                    <a:cs typeface="Times New Roman" charset="0"/>
+                  </a:rPr>
+                  <a:t>σR</a:t>
+                </a:r>
+                <a14:m>
+                  <m:oMath xmlns:m="http://schemas.openxmlformats.org/officeDocument/2006/math">
+                    <m:f>
+                      <m:fPr>
+                        <m:ctrlPr>
+                          <a:rPr lang="en-US" sz="1400" b="0" smtClean="0">
+                            <a:latin typeface="Cambria Math" panose="02040503050406030204" pitchFamily="18" charset="0"/>
+                            <a:ea typeface="Times New Roman" charset="0"/>
+                            <a:cs typeface="Times New Roman" charset="0"/>
+                          </a:rPr>
+                        </m:ctrlPr>
+                      </m:fPr>
+                      <m:num>
+                        <m:r>
+                          <m:rPr>
+                            <m:sty m:val="p"/>
+                          </m:rPr>
+                          <a:rPr lang="en-US" sz="1400" b="0" i="0" smtClean="0">
+                            <a:latin typeface="Cambria Math" panose="02040503050406030204" pitchFamily="18" charset="0"/>
+                            <a:ea typeface="Times New Roman" charset="0"/>
+                            <a:cs typeface="Times New Roman" charset="0"/>
+                          </a:rPr>
+                          <m:t>H</m:t>
+                        </m:r>
+                      </m:num>
+                      <m:den>
+                        <m:r>
+                          <m:rPr>
+                            <m:sty m:val="p"/>
+                          </m:rPr>
+                          <a:rPr lang="en-US" sz="1400" b="0" i="0" smtClean="0">
+                            <a:latin typeface="Cambria Math" panose="02040503050406030204" pitchFamily="18" charset="0"/>
+                            <a:ea typeface="Times New Roman" charset="0"/>
+                            <a:cs typeface="Times New Roman" charset="0"/>
+                          </a:rPr>
+                          <m:t>A</m:t>
+                        </m:r>
+                        <m:r>
+                          <a:rPr lang="en-US" sz="1400" b="0" i="0" smtClean="0">
+                            <a:latin typeface="Cambria Math" panose="02040503050406030204" pitchFamily="18" charset="0"/>
+                            <a:ea typeface="Times New Roman" charset="0"/>
+                            <a:cs typeface="Times New Roman" charset="0"/>
+                          </a:rPr>
+                          <m:t>+</m:t>
+                        </m:r>
+                        <m:r>
+                          <m:rPr>
+                            <m:sty m:val="p"/>
+                          </m:rPr>
+                          <a:rPr lang="en-US" sz="1400" b="0" i="0" smtClean="0">
+                            <a:latin typeface="Cambria Math" panose="02040503050406030204" pitchFamily="18" charset="0"/>
+                            <a:ea typeface="Times New Roman" charset="0"/>
+                            <a:cs typeface="Times New Roman" charset="0"/>
+                          </a:rPr>
+                          <m:t>H</m:t>
+                        </m:r>
+                      </m:den>
+                    </m:f>
+                  </m:oMath>
+                </a14:m>
+                <a:endParaRPr lang="en-US" sz="1400" b="0" dirty="0">
+                  <a:latin typeface="Times New Roman" charset="0"/>
+                  <a:ea typeface="Times New Roman" charset="0"/>
+                  <a:cs typeface="Times New Roman" charset="0"/>
+                </a:endParaRPr>
+              </a:p>
+              <a:p>
+                <a:pPr algn="ctr"/>
+                <a:endParaRPr lang="en-US" sz="1400" dirty="0">
+                  <a:latin typeface="Times New Roman" charset="0"/>
+                  <a:ea typeface="Times New Roman" charset="0"/>
+                  <a:cs typeface="Times New Roman" charset="0"/>
+                </a:endParaRPr>
+              </a:p>
+            </p:txBody>
+          </p:sp>
+        </mc:Choice>
+        <mc:Fallback>
+          <p:sp>
+            <p:nvSpPr>
+              <p:cNvPr id="53" name="TextBox 52">
+                <a:extLst>
+                  <a:ext uri="{FF2B5EF4-FFF2-40B4-BE49-F238E27FC236}">
+                    <a16:creationId xmlns:a16="http://schemas.microsoft.com/office/drawing/2014/main" id="{F94E7BCE-A4B0-F643-BAE8-8B0328802A75}"/>
+                  </a:ext>
+                </a:extLst>
+              </p:cNvPr>
+              <p:cNvSpPr txBox="1">
+                <a:spLocks noRot="1" noChangeAspect="1" noMove="1" noResize="1" noEditPoints="1" noAdjustHandles="1" noChangeArrowheads="1" noChangeShapeType="1" noTextEdit="1"/>
+              </p:cNvSpPr>
+              <p:nvPr/>
+            </p:nvSpPr>
+            <p:spPr>
+              <a:xfrm>
+                <a:off x="7289015" y="3397412"/>
+                <a:ext cx="1160612" cy="632609"/>
+              </a:xfrm>
+              <a:prstGeom prst="rect">
+                <a:avLst/>
+              </a:prstGeom>
+              <a:blipFill>
+                <a:blip r:embed="rId3"/>
+                <a:stretch>
+                  <a:fillRect/>
+                </a:stretch>
+              </a:blipFill>
+            </p:spPr>
+            <p:txBody>
+              <a:bodyPr/>
+              <a:lstStyle/>
+              <a:p>
+                <a:r>
+                  <a:rPr lang="en-US">
+                    <a:noFill/>
+                  </a:rPr>
+                  <a:t> </a:t>
+                </a:r>
+              </a:p>
+            </p:txBody>
+          </p:sp>
+        </mc:Fallback>
+      </mc:AlternateContent>
     </p:spTree>
     <p:extLst>
       <p:ext uri="{BB962C8B-B14F-4D97-AF65-F5344CB8AC3E}">

</xml_diff>

<commit_message>
putting in perturbation term into A+H fraction and writing up modified addiction free equilibrium work
</commit_message>
<xml_diff>
--- a/heroin_model_formulation/heroin_schematic.pptx
+++ b/heroin_model_formulation/heroin_schematic.pptx
@@ -301,7 +301,7 @@
           <a:lstStyle/>
           <a:p>
             <a:fld id="{5A3E0873-EA00-D142-ACA6-784333225662}" type="datetimeFigureOut">
-              <a:t>1/9/19</a:t>
+              <a:t>1/18/19</a:t>
             </a:fld>
             <a:endParaRPr lang="en-US"/>
           </a:p>
@@ -467,7 +467,7 @@
           <a:lstStyle/>
           <a:p>
             <a:fld id="{5A3E0873-EA00-D142-ACA6-784333225662}" type="datetimeFigureOut">
-              <a:t>1/9/19</a:t>
+              <a:t>1/18/19</a:t>
             </a:fld>
             <a:endParaRPr lang="en-US"/>
           </a:p>
@@ -643,7 +643,7 @@
           <a:lstStyle/>
           <a:p>
             <a:fld id="{5A3E0873-EA00-D142-ACA6-784333225662}" type="datetimeFigureOut">
-              <a:t>1/9/19</a:t>
+              <a:t>1/18/19</a:t>
             </a:fld>
             <a:endParaRPr lang="en-US"/>
           </a:p>
@@ -809,7 +809,7 @@
           <a:lstStyle/>
           <a:p>
             <a:fld id="{5A3E0873-EA00-D142-ACA6-784333225662}" type="datetimeFigureOut">
-              <a:t>1/9/19</a:t>
+              <a:t>1/18/19</a:t>
             </a:fld>
             <a:endParaRPr lang="en-US"/>
           </a:p>
@@ -1052,7 +1052,7 @@
           <a:lstStyle/>
           <a:p>
             <a:fld id="{5A3E0873-EA00-D142-ACA6-784333225662}" type="datetimeFigureOut">
-              <a:t>1/9/19</a:t>
+              <a:t>1/18/19</a:t>
             </a:fld>
             <a:endParaRPr lang="en-US"/>
           </a:p>
@@ -1335,7 +1335,7 @@
           <a:lstStyle/>
           <a:p>
             <a:fld id="{5A3E0873-EA00-D142-ACA6-784333225662}" type="datetimeFigureOut">
-              <a:t>1/9/19</a:t>
+              <a:t>1/18/19</a:t>
             </a:fld>
             <a:endParaRPr lang="en-US"/>
           </a:p>
@@ -1752,7 +1752,7 @@
           <a:lstStyle/>
           <a:p>
             <a:fld id="{5A3E0873-EA00-D142-ACA6-784333225662}" type="datetimeFigureOut">
-              <a:t>1/9/19</a:t>
+              <a:t>1/18/19</a:t>
             </a:fld>
             <a:endParaRPr lang="en-US"/>
           </a:p>
@@ -1867,7 +1867,7 @@
           <a:lstStyle/>
           <a:p>
             <a:fld id="{5A3E0873-EA00-D142-ACA6-784333225662}" type="datetimeFigureOut">
-              <a:t>1/9/19</a:t>
+              <a:t>1/18/19</a:t>
             </a:fld>
             <a:endParaRPr lang="en-US"/>
           </a:p>
@@ -1960,7 +1960,7 @@
           <a:lstStyle/>
           <a:p>
             <a:fld id="{5A3E0873-EA00-D142-ACA6-784333225662}" type="datetimeFigureOut">
-              <a:t>1/9/19</a:t>
+              <a:t>1/18/19</a:t>
             </a:fld>
             <a:endParaRPr lang="en-US"/>
           </a:p>
@@ -2233,7 +2233,7 @@
           <a:lstStyle/>
           <a:p>
             <a:fld id="{5A3E0873-EA00-D142-ACA6-784333225662}" type="datetimeFigureOut">
-              <a:t>1/9/19</a:t>
+              <a:t>1/18/19</a:t>
             </a:fld>
             <a:endParaRPr lang="en-US"/>
           </a:p>
@@ -2483,7 +2483,7 @@
           <a:lstStyle/>
           <a:p>
             <a:fld id="{5A3E0873-EA00-D142-ACA6-784333225662}" type="datetimeFigureOut">
-              <a:t>1/9/19</a:t>
+              <a:t>1/18/19</a:t>
             </a:fld>
             <a:endParaRPr lang="en-US"/>
           </a:p>
@@ -2692,7 +2692,7 @@
           </a:lstStyle>
           <a:p>
             <a:fld id="{5A3E0873-EA00-D142-ACA6-784333225662}" type="datetimeFigureOut">
-              <a:t>1/9/19</a:t>
+              <a:t>1/18/19</a:t>
             </a:fld>
             <a:endParaRPr lang="en-US"/>
           </a:p>
@@ -3913,7 +3913,7 @@
             </p:nvSpPr>
             <p:spPr>
               <a:xfrm>
-                <a:off x="5948109" y="3200469"/>
+                <a:off x="5954608" y="3139556"/>
                 <a:ext cx="1160612" cy="613630"/>
               </a:xfrm>
               <a:prstGeom prst="rect">
@@ -3949,7 +3949,7 @@
                     <m:f>
                       <m:fPr>
                         <m:ctrlPr>
-                          <a:rPr lang="en-US" sz="1400" b="0" smtClean="0">
+                          <a:rPr lang="en-US" sz="1400" b="0" i="1" smtClean="0">
                             <a:latin typeface="Cambria Math" panose="02040503050406030204" pitchFamily="18" charset="0"/>
                             <a:ea typeface="Times New Roman" charset="0"/>
                             <a:cs typeface="Times New Roman" charset="0"/>
@@ -4000,6 +4000,22 @@
                           </a:rPr>
                           <m:t>H</m:t>
                         </m:r>
+                        <m:r>
+                          <a:rPr lang="en-US" sz="1400" b="0" i="0" smtClean="0">
+                            <a:latin typeface="Cambria Math" panose="02040503050406030204" pitchFamily="18" charset="0"/>
+                            <a:ea typeface="Times New Roman" charset="0"/>
+                            <a:cs typeface="Times New Roman" charset="0"/>
+                          </a:rPr>
+                          <m:t>+</m:t>
+                        </m:r>
+                        <m:r>
+                          <a:rPr lang="en-US" sz="1400" b="0" i="1" smtClean="0">
+                            <a:latin typeface="Cambria Math" panose="02040503050406030204" pitchFamily="18" charset="0"/>
+                            <a:ea typeface="Times New Roman" charset="0"/>
+                            <a:cs typeface="Times New Roman" charset="0"/>
+                          </a:rPr>
+                          <m:t>𝜔</m:t>
+                        </m:r>
                       </m:den>
                     </m:f>
                   </m:oMath>
@@ -4032,7 +4048,7 @@
             </p:nvSpPr>
             <p:spPr>
               <a:xfrm>
-                <a:off x="5948109" y="3200469"/>
+                <a:off x="5954608" y="3139556"/>
                 <a:ext cx="1160612" cy="613630"/>
               </a:xfrm>
               <a:prstGeom prst="rect">
@@ -5180,7 +5196,7 @@
             </p:nvSpPr>
             <p:spPr>
               <a:xfrm>
-                <a:off x="7289015" y="3397412"/>
+                <a:off x="7391852" y="3412739"/>
                 <a:ext cx="1160612" cy="632609"/>
               </a:xfrm>
               <a:prstGeom prst="rect">
@@ -5216,7 +5232,7 @@
                     <m:f>
                       <m:fPr>
                         <m:ctrlPr>
-                          <a:rPr lang="en-US" sz="1400" b="0" smtClean="0">
+                          <a:rPr lang="en-US" sz="1400" i="1">
                             <a:latin typeface="Cambria Math" panose="02040503050406030204" pitchFamily="18" charset="0"/>
                             <a:ea typeface="Times New Roman" charset="0"/>
                             <a:cs typeface="Times New Roman" charset="0"/>
@@ -5241,7 +5257,7 @@
                           <m:rPr>
                             <m:sty m:val="p"/>
                           </m:rPr>
-                          <a:rPr lang="en-US" sz="1400" b="0" i="0" smtClean="0">
+                          <a:rPr lang="en-US" sz="1400">
                             <a:latin typeface="Cambria Math" panose="02040503050406030204" pitchFamily="18" charset="0"/>
                             <a:ea typeface="Times New Roman" charset="0"/>
                             <a:cs typeface="Times New Roman" charset="0"/>
@@ -5249,7 +5265,7 @@
                           <m:t>A</m:t>
                         </m:r>
                         <m:r>
-                          <a:rPr lang="en-US" sz="1400" b="0" i="0" smtClean="0">
+                          <a:rPr lang="en-US" sz="1400">
                             <a:latin typeface="Cambria Math" panose="02040503050406030204" pitchFamily="18" charset="0"/>
                             <a:ea typeface="Times New Roman" charset="0"/>
                             <a:cs typeface="Times New Roman" charset="0"/>
@@ -5260,12 +5276,28 @@
                           <m:rPr>
                             <m:sty m:val="p"/>
                           </m:rPr>
-                          <a:rPr lang="en-US" sz="1400" b="0" i="0" smtClean="0">
+                          <a:rPr lang="en-US" sz="1400">
                             <a:latin typeface="Cambria Math" panose="02040503050406030204" pitchFamily="18" charset="0"/>
                             <a:ea typeface="Times New Roman" charset="0"/>
                             <a:cs typeface="Times New Roman" charset="0"/>
                           </a:rPr>
                           <m:t>H</m:t>
+                        </m:r>
+                        <m:r>
+                          <a:rPr lang="en-US" sz="1400">
+                            <a:latin typeface="Cambria Math" panose="02040503050406030204" pitchFamily="18" charset="0"/>
+                            <a:ea typeface="Times New Roman" charset="0"/>
+                            <a:cs typeface="Times New Roman" charset="0"/>
+                          </a:rPr>
+                          <m:t>+</m:t>
+                        </m:r>
+                        <m:r>
+                          <a:rPr lang="en-US" sz="1400" i="1">
+                            <a:latin typeface="Cambria Math" panose="02040503050406030204" pitchFamily="18" charset="0"/>
+                            <a:ea typeface="Times New Roman" charset="0"/>
+                            <a:cs typeface="Times New Roman" charset="0"/>
+                          </a:rPr>
+                          <m:t>𝜔</m:t>
                         </m:r>
                       </m:den>
                     </m:f>
@@ -5305,7 +5337,7 @@
             </p:nvSpPr>
             <p:spPr>
               <a:xfrm>
-                <a:off x="7289015" y="3397412"/>
+                <a:off x="7391852" y="3412739"/>
                 <a:ext cx="1160612" cy="632609"/>
               </a:xfrm>
               <a:prstGeom prst="rect">

</xml_diff>